<commit_message>
small additions to powerpoint
</commit_message>
<xml_diff>
--- a/presentation/presentation.pptx
+++ b/presentation/presentation.pptx
@@ -113,7 +113,16 @@
       </a:defRPr>
     </a:lvl9pPr>
   </p:defaultTextStyle>
+  <p:extLst>
+    <p:ext uri="{EFAFB233-063F-42B5-8137-9DF3F51BA10A}">
+      <p15:sldGuideLst xmlns:p15="http://schemas.microsoft.com/office/powerpoint/2012/main"/>
+    </p:ext>
+  </p:extLst>
 </p:presentation>
+</file>
+
+<file path=ppt/revisionInfo.xml><?xml version="1.0" encoding="utf-8"?>
+<p1510:revInfo xmlns:a="http://schemas.openxmlformats.org/drawingml/2006/main" xmlns:r="http://schemas.openxmlformats.org/officeDocument/2006/relationships" xmlns:p1510="http://schemas.microsoft.com/office/powerpoint/2015/10/main"/>
 </file>
 
 <file path=ppt/notesMasters/notesMaster1.xml><?xml version="1.0" encoding="utf-8"?>
@@ -511,17 +520,30 @@
           <a:lstStyle/>
           <a:p>
             <a:r>
+              <a:rPr lang="nl-NL" dirty="0" err="1"/>
+              <a:t>Theory</a:t>
+            </a:r>
+            <a:r>
               <a:rPr lang="nl-NL" dirty="0"/>
-              <a:t>Records, </a:t>
-            </a:r>
-            <a:r>
-              <a:rPr lang="nl-NL" dirty="0" err="1"/>
-              <a:t>organize</a:t>
-            </a:r>
+              <a:t> extra:</a:t>
+            </a:r>
+          </a:p>
+          <a:p>
             <a:r>
               <a:rPr lang="nl-NL" dirty="0"/>
-              <a:t> have</a:t>
-            </a:r>
+              <a:t>https://www.3pillarglobal.com/insights/exploring-the-different-types-of-nosql-databases</a:t>
+            </a:r>
+          </a:p>
+          <a:p>
+            <a:r>
+              <a:rPr lang="nl-NL" dirty="0"/>
+              <a:t>https://www.slideshare.net/slidarko/an-overview-of-data-management-paradigms-relational-document-and-graph-3880059</a:t>
+            </a:r>
+          </a:p>
+          <a:p>
+            <a:endParaRPr lang="nl-NL" dirty="0"/>
+          </a:p>
+          <a:p>
             <a:endParaRPr lang="en-GB" dirty="0"/>
           </a:p>
         </p:txBody>
@@ -1102,7 +1124,7 @@
             <a:fld id="{5586B75A-687E-405C-8A0B-8D00578BA2C3}" type="datetimeFigureOut">
               <a:rPr lang="en-US" smtClean="0"/>
               <a:pPr/>
-              <a:t>6/18/2017</a:t>
+              <a:t>6/19/2017</a:t>
             </a:fld>
             <a:endParaRPr lang="en-US" dirty="0"/>
           </a:p>
@@ -1274,7 +1296,7 @@
             <a:fld id="{5586B75A-687E-405C-8A0B-8D00578BA2C3}" type="datetimeFigureOut">
               <a:rPr lang="en-US" smtClean="0"/>
               <a:pPr/>
-              <a:t>6/18/2017</a:t>
+              <a:t>6/19/2017</a:t>
             </a:fld>
             <a:endParaRPr lang="en-US" dirty="0"/>
           </a:p>
@@ -1456,7 +1478,7 @@
             <a:fld id="{5586B75A-687E-405C-8A0B-8D00578BA2C3}" type="datetimeFigureOut">
               <a:rPr lang="en-US" smtClean="0"/>
               <a:pPr/>
-              <a:t>6/18/2017</a:t>
+              <a:t>6/19/2017</a:t>
             </a:fld>
             <a:endParaRPr lang="en-US" dirty="0"/>
           </a:p>
@@ -1628,7 +1650,7 @@
             <a:fld id="{5586B75A-687E-405C-8A0B-8D00578BA2C3}" type="datetimeFigureOut">
               <a:rPr lang="en-US" smtClean="0"/>
               <a:pPr/>
-              <a:t>6/18/2017</a:t>
+              <a:t>6/19/2017</a:t>
             </a:fld>
             <a:endParaRPr lang="en-US" dirty="0"/>
           </a:p>
@@ -1890,7 +1912,7 @@
             <a:fld id="{5586B75A-687E-405C-8A0B-8D00578BA2C3}" type="datetimeFigureOut">
               <a:rPr lang="en-US" smtClean="0"/>
               <a:pPr/>
-              <a:t>6/18/2017</a:t>
+              <a:t>6/19/2017</a:t>
             </a:fld>
             <a:endParaRPr lang="en-US" dirty="0"/>
           </a:p>
@@ -2124,7 +2146,7 @@
             <a:fld id="{5586B75A-687E-405C-8A0B-8D00578BA2C3}" type="datetimeFigureOut">
               <a:rPr lang="en-US" smtClean="0"/>
               <a:pPr/>
-              <a:t>6/18/2017</a:t>
+              <a:t>6/19/2017</a:t>
             </a:fld>
             <a:endParaRPr lang="en-US" dirty="0"/>
           </a:p>
@@ -2485,7 +2507,7 @@
             <a:fld id="{5586B75A-687E-405C-8A0B-8D00578BA2C3}" type="datetimeFigureOut">
               <a:rPr lang="en-US" smtClean="0"/>
               <a:pPr/>
-              <a:t>6/18/2017</a:t>
+              <a:t>6/19/2017</a:t>
             </a:fld>
             <a:endParaRPr lang="en-US" dirty="0"/>
           </a:p>
@@ -2628,7 +2650,7 @@
             <a:fld id="{5586B75A-687E-405C-8A0B-8D00578BA2C3}" type="datetimeFigureOut">
               <a:rPr lang="en-US" smtClean="0"/>
               <a:pPr/>
-              <a:t>6/18/2017</a:t>
+              <a:t>6/19/2017</a:t>
             </a:fld>
             <a:endParaRPr lang="en-US" dirty="0"/>
           </a:p>
@@ -2725,7 +2747,7 @@
             <a:fld id="{5586B75A-687E-405C-8A0B-8D00578BA2C3}" type="datetimeFigureOut">
               <a:rPr lang="en-US" smtClean="0"/>
               <a:pPr/>
-              <a:t>6/18/2017</a:t>
+              <a:t>6/19/2017</a:t>
             </a:fld>
             <a:endParaRPr lang="en-US" dirty="0"/>
           </a:p>
@@ -3084,7 +3106,7 @@
             <a:fld id="{5586B75A-687E-405C-8A0B-8D00578BA2C3}" type="datetimeFigureOut">
               <a:rPr lang="en-US" smtClean="0"/>
               <a:pPr/>
-              <a:t>6/18/2017</a:t>
+              <a:t>6/19/2017</a:t>
             </a:fld>
             <a:endParaRPr lang="en-US" dirty="0"/>
           </a:p>
@@ -3443,7 +3465,7 @@
             <a:fld id="{5586B75A-687E-405C-8A0B-8D00578BA2C3}" type="datetimeFigureOut">
               <a:rPr lang="en-US" smtClean="0"/>
               <a:pPr/>
-              <a:t>6/18/2017</a:t>
+              <a:t>6/19/2017</a:t>
             </a:fld>
             <a:endParaRPr lang="en-US" dirty="0"/>
           </a:p>
@@ -3681,7 +3703,7 @@
             <a:fld id="{5586B75A-687E-405C-8A0B-8D00578BA2C3}" type="datetimeFigureOut">
               <a:rPr lang="en-US" smtClean="0"/>
               <a:pPr/>
-              <a:t>6/18/2017</a:t>
+              <a:t>6/19/2017</a:t>
             </a:fld>
             <a:endParaRPr lang="en-US" dirty="0"/>
           </a:p>
@@ -4256,12 +4278,8 @@
           <a:lstStyle/>
           <a:p>
             <a:r>
-              <a:rPr lang="nl-NL" dirty="0" err="1"/>
-              <a:t>Developed</a:t>
-            </a:r>
-            <a:r>
               <a:rPr lang="nl-NL" dirty="0"/>
-              <a:t> </a:t>
+              <a:t>Development </a:t>
             </a:r>
             <a:r>
               <a:rPr lang="nl-NL" dirty="0" err="1"/>
@@ -5060,9 +5078,9 @@
         <p:grpSpPr>
           <a:xfrm>
             <a:off x="6432699" y="1815208"/>
-            <a:ext cx="4633951" cy="913651"/>
+            <a:ext cx="4443386" cy="913651"/>
             <a:chOff x="5518298" y="1102225"/>
-            <a:chExt cx="4633951" cy="913651"/>
+            <a:chExt cx="4443386" cy="913651"/>
           </a:xfrm>
         </p:grpSpPr>
         <p:pic>
@@ -5141,13 +5159,13 @@
                 </a:ext>
               </a:extLst>
             </a:blip>
-            <a:srcRect t="74733" b="10380"/>
+            <a:srcRect t="74733" r="4841" b="10380"/>
             <a:stretch/>
           </p:blipFill>
           <p:spPr bwMode="auto">
             <a:xfrm>
               <a:off x="6215831" y="1233490"/>
-              <a:ext cx="3936418" cy="651123"/>
+              <a:ext cx="3745853" cy="651123"/>
             </a:xfrm>
             <a:prstGeom prst="rect">
               <a:avLst/>
@@ -5179,7 +5197,7 @@
           </p:cNvPicPr>
           <p:nvPr/>
         </p:nvPicPr>
-        <p:blipFill>
+        <p:blipFill rotWithShape="1">
           <a:blip r:embed="rId5">
             <a:extLst>
               <a:ext uri="{28A0092B-C50C-407E-A947-70E740481C1C}">
@@ -5187,15 +5205,13 @@
               </a:ext>
             </a:extLst>
           </a:blip>
-          <a:srcRect/>
-          <a:stretch>
-            <a:fillRect/>
-          </a:stretch>
+          <a:srcRect t="18059" b="17366"/>
+          <a:stretch/>
         </p:blipFill>
         <p:spPr bwMode="auto">
           <a:xfrm>
-            <a:off x="8004475" y="3999224"/>
-            <a:ext cx="2583710" cy="1347220"/>
+            <a:off x="8004475" y="4189786"/>
+            <a:ext cx="2583710" cy="869952"/>
           </a:xfrm>
           <a:prstGeom prst="rect">
             <a:avLst/>
@@ -8242,7 +8258,7 @@
             </a:xfrm>
             <a:prstGeom prst="arc">
               <a:avLst>
-                <a:gd name="adj1" fmla="val 16936406"/>
+                <a:gd name="adj1" fmla="val 17164326"/>
                 <a:gd name="adj2" fmla="val 4718251"/>
               </a:avLst>
             </a:prstGeom>
@@ -8621,6 +8637,96 @@
               <a:t>Monday, 19 June 2017</a:t>
             </a:fld>
             <a:endParaRPr lang="en-GB" dirty="0"/>
+          </a:p>
+        </p:txBody>
+      </p:sp>
+      <p:sp>
+        <p:nvSpPr>
+          <p:cNvPr id="2" name="Tekstvak 1">
+            <a:extLst>
+              <a:ext uri="{FF2B5EF4-FFF2-40B4-BE49-F238E27FC236}">
+                <a16:creationId xmlns:a16="http://schemas.microsoft.com/office/drawing/2014/main" id="{4E8819B9-733C-432B-BFEF-C7A39F6F8061}"/>
+              </a:ext>
+            </a:extLst>
+          </p:cNvPr>
+          <p:cNvSpPr txBox="1"/>
+          <p:nvPr/>
+        </p:nvSpPr>
+        <p:spPr>
+          <a:xfrm>
+            <a:off x="2465626" y="1280994"/>
+            <a:ext cx="917258" cy="369332"/>
+          </a:xfrm>
+          <a:prstGeom prst="rect">
+            <a:avLst/>
+          </a:prstGeom>
+          <a:noFill/>
+        </p:spPr>
+        <p:txBody>
+          <a:bodyPr wrap="square" rtlCol="0">
+            <a:spAutoFit/>
+          </a:bodyPr>
+          <a:lstStyle/>
+          <a:p>
+            <a:pPr algn="ctr"/>
+            <a:r>
+              <a:rPr lang="nl-NL" dirty="0">
+                <a:solidFill>
+                  <a:schemeClr val="bg1"/>
+                </a:solidFill>
+              </a:rPr>
+              <a:t>SQL</a:t>
+            </a:r>
+            <a:endParaRPr lang="en-GB" dirty="0">
+              <a:solidFill>
+                <a:schemeClr val="bg1"/>
+              </a:solidFill>
+            </a:endParaRPr>
+          </a:p>
+        </p:txBody>
+      </p:sp>
+      <p:sp>
+        <p:nvSpPr>
+          <p:cNvPr id="36" name="Tekstvak 35">
+            <a:extLst>
+              <a:ext uri="{FF2B5EF4-FFF2-40B4-BE49-F238E27FC236}">
+                <a16:creationId xmlns:a16="http://schemas.microsoft.com/office/drawing/2014/main" id="{2BBCD341-8BA4-446B-9ED4-A53EF6BC056E}"/>
+              </a:ext>
+            </a:extLst>
+          </p:cNvPr>
+          <p:cNvSpPr txBox="1"/>
+          <p:nvPr/>
+        </p:nvSpPr>
+        <p:spPr>
+          <a:xfrm>
+            <a:off x="7377202" y="1280994"/>
+            <a:ext cx="917258" cy="369332"/>
+          </a:xfrm>
+          <a:prstGeom prst="rect">
+            <a:avLst/>
+          </a:prstGeom>
+          <a:noFill/>
+        </p:spPr>
+        <p:txBody>
+          <a:bodyPr wrap="square" rtlCol="0">
+            <a:spAutoFit/>
+          </a:bodyPr>
+          <a:lstStyle/>
+          <a:p>
+            <a:pPr algn="ctr"/>
+            <a:r>
+              <a:rPr lang="nl-NL" dirty="0" err="1">
+                <a:solidFill>
+                  <a:schemeClr val="bg1"/>
+                </a:solidFill>
+              </a:rPr>
+              <a:t>NoSQL</a:t>
+            </a:r>
+            <a:endParaRPr lang="en-GB" dirty="0">
+              <a:solidFill>
+                <a:schemeClr val="bg1"/>
+              </a:solidFill>
+            </a:endParaRPr>
           </a:p>
         </p:txBody>
       </p:sp>

</xml_diff>

<commit_message>
Presentation extended with mongoDB
</commit_message>
<xml_diff>
--- a/presentation/presentation.pptx
+++ b/presentation/presentation.pptx
@@ -5,16 +5,18 @@
     <p:sldMasterId id="2147483852" r:id="rId1"/>
   </p:sldMasterIdLst>
   <p:notesMasterIdLst>
-    <p:notesMasterId r:id="rId9"/>
+    <p:notesMasterId r:id="rId11"/>
   </p:notesMasterIdLst>
   <p:sldIdLst>
     <p:sldId id="256" r:id="rId2"/>
     <p:sldId id="257" r:id="rId3"/>
     <p:sldId id="258" r:id="rId4"/>
-    <p:sldId id="259" r:id="rId5"/>
-    <p:sldId id="260" r:id="rId6"/>
-    <p:sldId id="261" r:id="rId7"/>
-    <p:sldId id="262" r:id="rId8"/>
+    <p:sldId id="263" r:id="rId5"/>
+    <p:sldId id="259" r:id="rId6"/>
+    <p:sldId id="260" r:id="rId7"/>
+    <p:sldId id="261" r:id="rId8"/>
+    <p:sldId id="264" r:id="rId9"/>
+    <p:sldId id="262" r:id="rId10"/>
   </p:sldIdLst>
   <p:sldSz cx="12192000" cy="6858000"/>
   <p:notesSz cx="6858000" cy="9144000"/>
@@ -670,7 +672,7 @@
     </p:spTree>
     <p:extLst>
       <p:ext uri="{BB962C8B-B14F-4D97-AF65-F5344CB8AC3E}">
-        <p14:creationId xmlns:p14="http://schemas.microsoft.com/office/powerpoint/2010/main" val="1307367882"/>
+        <p14:creationId xmlns:p14="http://schemas.microsoft.com/office/powerpoint/2010/main" val="2375420657"/>
       </p:ext>
     </p:extLst>
   </p:cSld>
@@ -766,7 +768,7 @@
     </p:spTree>
     <p:extLst>
       <p:ext uri="{BB962C8B-B14F-4D97-AF65-F5344CB8AC3E}">
-        <p14:creationId xmlns:p14="http://schemas.microsoft.com/office/powerpoint/2010/main" val="3419548648"/>
+        <p14:creationId xmlns:p14="http://schemas.microsoft.com/office/powerpoint/2010/main" val="1307367882"/>
       </p:ext>
     </p:extLst>
   </p:cSld>
@@ -821,18 +823,124 @@
           <a:lstStyle/>
           <a:p>
             <a:r>
-              <a:rPr lang="nl-NL" dirty="0"/>
-              <a:t>Records, </a:t>
-            </a:r>
-            <a:r>
-              <a:rPr lang="nl-NL" dirty="0" err="1"/>
-              <a:t>organize</a:t>
-            </a:r>
-            <a:r>
-              <a:rPr lang="nl-NL" dirty="0"/>
-              <a:t> have</a:t>
-            </a:r>
+              <a:rPr lang="en-GB" dirty="0" err="1"/>
+              <a:t>Preprocessing</a:t>
+            </a:r>
+            <a:r>
+              <a:rPr lang="en-GB" dirty="0"/>
+              <a:t> </a:t>
+            </a:r>
+          </a:p>
+          <a:p>
+            <a:r>
+              <a:rPr lang="en-GB" dirty="0"/>
+              <a:t>-export csv files from PostgreSQL with joined tables</a:t>
+            </a:r>
+          </a:p>
+          <a:p>
+            <a:r>
+              <a:rPr lang="en-GB" dirty="0"/>
+              <a:t>-import csv files to MongoDB using </a:t>
+            </a:r>
+            <a:r>
+              <a:rPr lang="en-GB" dirty="0" err="1"/>
+              <a:t>Pyhton</a:t>
+            </a:r>
+            <a:r>
+              <a:rPr lang="en-GB" dirty="0"/>
+              <a:t> scripts</a:t>
+            </a:r>
+          </a:p>
+          <a:p>
+            <a:r>
+              <a:rPr lang="en-GB" dirty="0"/>
+              <a:t>-create indexes to speed up access to the database</a:t>
+            </a:r>
+          </a:p>
+          <a:p>
             <a:endParaRPr lang="en-GB" dirty="0"/>
+          </a:p>
+          <a:p>
+            <a:r>
+              <a:rPr lang="en-GB" dirty="0"/>
+              <a:t>Implementation</a:t>
+            </a:r>
+          </a:p>
+          <a:p>
+            <a:r>
+              <a:rPr lang="en-GB" dirty="0"/>
+              <a:t>2 types of queries were used </a:t>
+            </a:r>
+          </a:p>
+          <a:p>
+            <a:r>
+              <a:rPr lang="en-GB" dirty="0"/>
+              <a:t>- search query</a:t>
+            </a:r>
+          </a:p>
+          <a:p>
+            <a:r>
+              <a:rPr lang="en-GB" dirty="0"/>
+              <a:t>- bulk query to </a:t>
+            </a:r>
+            <a:r>
+              <a:rPr lang="en-GB" dirty="0" err="1"/>
+              <a:t>retrive</a:t>
+            </a:r>
+            <a:r>
+              <a:rPr lang="en-GB" dirty="0"/>
+              <a:t> the wanted documents </a:t>
+            </a:r>
+            <a:r>
+              <a:rPr lang="en-GB" dirty="0" err="1"/>
+              <a:t>iDs</a:t>
+            </a:r>
+            <a:endParaRPr lang="en-GB" dirty="0"/>
+          </a:p>
+          <a:p>
+            <a:endParaRPr lang="en-GB" dirty="0"/>
+          </a:p>
+          <a:p>
+            <a:endParaRPr lang="en-GB" dirty="0"/>
+          </a:p>
+          <a:p>
+            <a:endParaRPr lang="en-GB" dirty="0"/>
+          </a:p>
+          <a:p>
+            <a:endParaRPr lang="en-GB" dirty="0"/>
+          </a:p>
+          <a:p>
+            <a:r>
+              <a:rPr lang="en-GB" dirty="0"/>
+              <a:t>Experience</a:t>
+            </a:r>
+          </a:p>
+          <a:p>
+            <a:endParaRPr lang="en-GB" dirty="0"/>
+          </a:p>
+          <a:p>
+            <a:r>
+              <a:rPr lang="en-GB" dirty="0"/>
+              <a:t>The immediate and fundamental difference between MongoDB and an RDBMS </a:t>
+            </a:r>
+          </a:p>
+          <a:p>
+            <a:r>
+              <a:rPr lang="en-GB" dirty="0"/>
+              <a:t>is the underlying data model. A relational database structures data </a:t>
+            </a:r>
+          </a:p>
+          <a:p>
+            <a:r>
+              <a:rPr lang="en-GB" dirty="0"/>
+              <a:t>into tables and rows, while MongoDB structures data into collections </a:t>
+            </a:r>
+          </a:p>
+          <a:p>
+            <a:r>
+              <a:rPr lang="en-GB" dirty="0"/>
+              <a:t>of JSON documents. JSON is a self-describing, human readable data format.</a:t>
+            </a:r>
           </a:p>
         </p:txBody>
       </p:sp>
@@ -862,7 +970,7 @@
     </p:spTree>
     <p:extLst>
       <p:ext uri="{BB962C8B-B14F-4D97-AF65-F5344CB8AC3E}">
-        <p14:creationId xmlns:p14="http://schemas.microsoft.com/office/powerpoint/2010/main" val="3972817073"/>
+        <p14:creationId xmlns:p14="http://schemas.microsoft.com/office/powerpoint/2010/main" val="3419548648"/>
       </p:ext>
     </p:extLst>
   </p:cSld>
@@ -950,6 +1058,252 @@
             <a:fld id="{15E04B8A-0251-463C-A261-6E5B4E7D1D15}" type="slidenum">
               <a:rPr lang="en-GB" smtClean="0"/>
               <a:t>7</a:t>
+            </a:fld>
+            <a:endParaRPr lang="en-GB"/>
+          </a:p>
+        </p:txBody>
+      </p:sp>
+    </p:spTree>
+    <p:extLst>
+      <p:ext uri="{BB962C8B-B14F-4D97-AF65-F5344CB8AC3E}">
+        <p14:creationId xmlns:p14="http://schemas.microsoft.com/office/powerpoint/2010/main" val="3972817073"/>
+      </p:ext>
+    </p:extLst>
+  </p:cSld>
+  <p:clrMapOvr>
+    <a:masterClrMapping/>
+  </p:clrMapOvr>
+</p:notes>
+</file>
+
+<file path=ppt/notesSlides/notesSlide6.xml><?xml version="1.0" encoding="utf-8"?>
+<p:notes xmlns:a="http://schemas.openxmlformats.org/drawingml/2006/main" xmlns:r="http://schemas.openxmlformats.org/officeDocument/2006/relationships" xmlns:p="http://schemas.openxmlformats.org/presentationml/2006/main">
+  <p:cSld>
+    <p:spTree>
+      <p:nvGrpSpPr>
+        <p:cNvPr id="1" name=""/>
+        <p:cNvGrpSpPr/>
+        <p:nvPr/>
+      </p:nvGrpSpPr>
+      <p:grpSpPr>
+        <a:xfrm>
+          <a:off x="0" y="0"/>
+          <a:ext cx="0" cy="0"/>
+          <a:chOff x="0" y="0"/>
+          <a:chExt cx="0" cy="0"/>
+        </a:xfrm>
+      </p:grpSpPr>
+      <p:sp>
+        <p:nvSpPr>
+          <p:cNvPr id="2" name="Tijdelijke aanduiding voor dia-afbeelding 1"/>
+          <p:cNvSpPr>
+            <a:spLocks noGrp="1" noRot="1" noChangeAspect="1"/>
+          </p:cNvSpPr>
+          <p:nvPr>
+            <p:ph type="sldImg"/>
+          </p:nvPr>
+        </p:nvSpPr>
+        <p:spPr/>
+      </p:sp>
+      <p:sp>
+        <p:nvSpPr>
+          <p:cNvPr id="3" name="Tijdelijke aanduiding voor notities 2"/>
+          <p:cNvSpPr>
+            <a:spLocks noGrp="1"/>
+          </p:cNvSpPr>
+          <p:nvPr>
+            <p:ph type="body" idx="1"/>
+          </p:nvPr>
+        </p:nvSpPr>
+        <p:spPr/>
+        <p:txBody>
+          <a:bodyPr/>
+          <a:lstStyle/>
+          <a:p>
+            <a:r>
+              <a:rPr lang="en-GB" dirty="0"/>
+              <a:t>Comparison</a:t>
+            </a:r>
+          </a:p>
+          <a:p>
+            <a:r>
+              <a:rPr lang="en-GB" dirty="0"/>
+              <a:t>+schema-less</a:t>
+            </a:r>
+          </a:p>
+          <a:p>
+            <a:r>
+              <a:rPr lang="en-GB" dirty="0"/>
+              <a:t>+ease scale-out</a:t>
+            </a:r>
+          </a:p>
+          <a:p>
+            <a:r>
+              <a:rPr lang="en-GB" dirty="0"/>
+              <a:t>+Cost</a:t>
+            </a:r>
+          </a:p>
+          <a:p>
+            <a:r>
+              <a:rPr lang="en-GB" dirty="0"/>
+              <a:t>-Database size</a:t>
+            </a:r>
+          </a:p>
+          <a:p>
+            <a:r>
+              <a:rPr lang="en-GB" dirty="0"/>
+              <a:t>-No support for transactions</a:t>
+            </a:r>
+          </a:p>
+          <a:p>
+            <a:r>
+              <a:rPr lang="en-GB" dirty="0"/>
+              <a:t>-Functionality</a:t>
+            </a:r>
+          </a:p>
+        </p:txBody>
+      </p:sp>
+      <p:sp>
+        <p:nvSpPr>
+          <p:cNvPr id="4" name="Tijdelijke aanduiding voor dianummer 3"/>
+          <p:cNvSpPr>
+            <a:spLocks noGrp="1"/>
+          </p:cNvSpPr>
+          <p:nvPr>
+            <p:ph type="sldNum" sz="quarter" idx="10"/>
+          </p:nvPr>
+        </p:nvSpPr>
+        <p:spPr/>
+        <p:txBody>
+          <a:bodyPr/>
+          <a:lstStyle/>
+          <a:p>
+            <a:fld id="{15E04B8A-0251-463C-A261-6E5B4E7D1D15}" type="slidenum">
+              <a:rPr lang="en-GB" smtClean="0"/>
+              <a:t>8</a:t>
+            </a:fld>
+            <a:endParaRPr lang="en-GB"/>
+          </a:p>
+        </p:txBody>
+      </p:sp>
+    </p:spTree>
+    <p:extLst>
+      <p:ext uri="{BB962C8B-B14F-4D97-AF65-F5344CB8AC3E}">
+        <p14:creationId xmlns:p14="http://schemas.microsoft.com/office/powerpoint/2010/main" val="1857662182"/>
+      </p:ext>
+    </p:extLst>
+  </p:cSld>
+  <p:clrMapOvr>
+    <a:masterClrMapping/>
+  </p:clrMapOvr>
+</p:notes>
+</file>
+
+<file path=ppt/notesSlides/notesSlide7.xml><?xml version="1.0" encoding="utf-8"?>
+<p:notes xmlns:a="http://schemas.openxmlformats.org/drawingml/2006/main" xmlns:r="http://schemas.openxmlformats.org/officeDocument/2006/relationships" xmlns:p="http://schemas.openxmlformats.org/presentationml/2006/main">
+  <p:cSld>
+    <p:spTree>
+      <p:nvGrpSpPr>
+        <p:cNvPr id="1" name=""/>
+        <p:cNvGrpSpPr/>
+        <p:nvPr/>
+      </p:nvGrpSpPr>
+      <p:grpSpPr>
+        <a:xfrm>
+          <a:off x="0" y="0"/>
+          <a:ext cx="0" cy="0"/>
+          <a:chOff x="0" y="0"/>
+          <a:chExt cx="0" cy="0"/>
+        </a:xfrm>
+      </p:grpSpPr>
+      <p:sp>
+        <p:nvSpPr>
+          <p:cNvPr id="2" name="Tijdelijke aanduiding voor dia-afbeelding 1"/>
+          <p:cNvSpPr>
+            <a:spLocks noGrp="1" noRot="1" noChangeAspect="1"/>
+          </p:cNvSpPr>
+          <p:nvPr>
+            <p:ph type="sldImg"/>
+          </p:nvPr>
+        </p:nvSpPr>
+        <p:spPr/>
+      </p:sp>
+      <p:sp>
+        <p:nvSpPr>
+          <p:cNvPr id="3" name="Tijdelijke aanduiding voor notities 2"/>
+          <p:cNvSpPr>
+            <a:spLocks noGrp="1"/>
+          </p:cNvSpPr>
+          <p:nvPr>
+            <p:ph type="body" idx="1"/>
+          </p:nvPr>
+        </p:nvSpPr>
+        <p:spPr/>
+        <p:txBody>
+          <a:bodyPr/>
+          <a:lstStyle/>
+          <a:p>
+            <a:r>
+              <a:rPr lang="en-GB" dirty="0"/>
+              <a:t>Comparison</a:t>
+            </a:r>
+          </a:p>
+          <a:p>
+            <a:r>
+              <a:rPr lang="en-GB" dirty="0"/>
+              <a:t>+schema-less</a:t>
+            </a:r>
+          </a:p>
+          <a:p>
+            <a:r>
+              <a:rPr lang="en-GB" dirty="0"/>
+              <a:t>+ease scale-out</a:t>
+            </a:r>
+          </a:p>
+          <a:p>
+            <a:r>
+              <a:rPr lang="en-GB" dirty="0"/>
+              <a:t>+Cost</a:t>
+            </a:r>
+          </a:p>
+          <a:p>
+            <a:r>
+              <a:rPr lang="en-GB" dirty="0"/>
+              <a:t>-Database size</a:t>
+            </a:r>
+          </a:p>
+          <a:p>
+            <a:r>
+              <a:rPr lang="en-GB" dirty="0"/>
+              <a:t>-No support for transactions</a:t>
+            </a:r>
+          </a:p>
+          <a:p>
+            <a:r>
+              <a:rPr lang="en-GB" dirty="0"/>
+              <a:t>-Functionality</a:t>
+            </a:r>
+          </a:p>
+        </p:txBody>
+      </p:sp>
+      <p:sp>
+        <p:nvSpPr>
+          <p:cNvPr id="4" name="Tijdelijke aanduiding voor dianummer 3"/>
+          <p:cNvSpPr>
+            <a:spLocks noGrp="1"/>
+          </p:cNvSpPr>
+          <p:nvPr>
+            <p:ph type="sldNum" sz="quarter" idx="10"/>
+          </p:nvPr>
+        </p:nvSpPr>
+        <p:spPr/>
+        <p:txBody>
+          <a:bodyPr/>
+          <a:lstStyle/>
+          <a:p>
+            <a:fld id="{15E04B8A-0251-463C-A261-6E5B4E7D1D15}" type="slidenum">
+              <a:rPr lang="en-GB" smtClean="0"/>
+              <a:t>9</a:t>
             </a:fld>
             <a:endParaRPr lang="en-GB"/>
           </a:p>
@@ -4143,6 +4497,14 @@
 <file path=ppt/slides/slide1.xml><?xml version="1.0" encoding="utf-8"?>
 <p:sld xmlns:a="http://schemas.openxmlformats.org/drawingml/2006/main" xmlns:r="http://schemas.openxmlformats.org/officeDocument/2006/relationships" xmlns:p="http://schemas.openxmlformats.org/presentationml/2006/main">
   <p:cSld>
+    <p:bg>
+      <p:bgPr>
+        <a:solidFill>
+          <a:srgbClr val="545454"/>
+        </a:solidFill>
+        <a:effectLst/>
+      </p:bgPr>
+    </p:bg>
     <p:spTree>
       <p:nvGrpSpPr>
         <p:cNvPr id="1" name=""/>
@@ -8762,6 +9124,739 @@
       </p:grpSpPr>
       <p:sp>
         <p:nvSpPr>
+          <p:cNvPr id="4" name="Titel 1">
+            <a:extLst>
+              <a:ext uri="{FF2B5EF4-FFF2-40B4-BE49-F238E27FC236}">
+                <a16:creationId xmlns:a16="http://schemas.microsoft.com/office/drawing/2014/main" id="{C8ABB5EF-8E57-4EEB-9736-2500EE5C4F25}"/>
+              </a:ext>
+            </a:extLst>
+          </p:cNvPr>
+          <p:cNvSpPr txBox="1">
+            <a:spLocks/>
+          </p:cNvSpPr>
+          <p:nvPr/>
+        </p:nvSpPr>
+        <p:spPr bwMode="black">
+          <a:xfrm>
+            <a:off x="1355831" y="423860"/>
+            <a:ext cx="9720000" cy="1188720"/>
+          </a:xfrm>
+          <a:prstGeom prst="rect">
+            <a:avLst/>
+          </a:prstGeom>
+          <a:solidFill>
+            <a:schemeClr val="accent5">
+              <a:lumMod val="60000"/>
+              <a:lumOff val="40000"/>
+            </a:schemeClr>
+          </a:solidFill>
+          <a:ln w="31750" cap="sq">
+            <a:solidFill>
+              <a:srgbClr val="404040"/>
+            </a:solidFill>
+            <a:miter lim="800000"/>
+          </a:ln>
+        </p:spPr>
+        <p:txBody>
+          <a:bodyPr vert="horz" lIns="182880" tIns="182880" rIns="182880" bIns="182880" rtlCol="0" anchor="ctr">
+            <a:normAutofit/>
+          </a:bodyPr>
+          <a:lstStyle>
+            <a:lvl1pPr algn="ctr" defTabSz="914400" rtl="0" eaLnBrk="1" latinLnBrk="0" hangingPunct="1">
+              <a:lnSpc>
+                <a:spcPct val="90000"/>
+              </a:lnSpc>
+              <a:spcBef>
+                <a:spcPct val="0"/>
+              </a:spcBef>
+              <a:buNone/>
+              <a:defRPr sz="2800" kern="1200" cap="all" spc="200" baseline="0">
+                <a:solidFill>
+                  <a:srgbClr val="262626"/>
+                </a:solidFill>
+                <a:latin typeface="+mj-lt"/>
+                <a:ea typeface="+mj-ea"/>
+                <a:cs typeface="+mj-cs"/>
+              </a:defRPr>
+            </a:lvl1pPr>
+          </a:lstStyle>
+          <a:p>
+            <a:pPr>
+              <a:tabLst>
+                <a:tab pos="180975" algn="l"/>
+                <a:tab pos="7177088" algn="r"/>
+              </a:tabLst>
+            </a:pPr>
+            <a:r>
+              <a:rPr lang="nl-NL" sz="3600" dirty="0"/>
+              <a:t>Showcase</a:t>
+            </a:r>
+            <a:endParaRPr lang="en-GB" sz="3600" dirty="0"/>
+          </a:p>
+        </p:txBody>
+      </p:sp>
+      <p:sp>
+        <p:nvSpPr>
+          <p:cNvPr id="5" name="Titel 1">
+            <a:extLst>
+              <a:ext uri="{FF2B5EF4-FFF2-40B4-BE49-F238E27FC236}">
+                <a16:creationId xmlns:a16="http://schemas.microsoft.com/office/drawing/2014/main" id="{249E61C2-B78A-48F8-9322-E2F850FC5B26}"/>
+              </a:ext>
+            </a:extLst>
+          </p:cNvPr>
+          <p:cNvSpPr txBox="1">
+            <a:spLocks/>
+          </p:cNvSpPr>
+          <p:nvPr/>
+        </p:nvSpPr>
+        <p:spPr bwMode="black">
+          <a:xfrm>
+            <a:off x="1355831" y="1612580"/>
+            <a:ext cx="3240000" cy="4777587"/>
+          </a:xfrm>
+          <a:prstGeom prst="rect">
+            <a:avLst/>
+          </a:prstGeom>
+          <a:solidFill>
+            <a:schemeClr val="accent1"/>
+          </a:solidFill>
+          <a:ln w="31750" cap="sq">
+            <a:solidFill>
+              <a:srgbClr val="404040"/>
+            </a:solidFill>
+            <a:miter lim="800000"/>
+          </a:ln>
+        </p:spPr>
+        <p:txBody>
+          <a:bodyPr vert="horz" lIns="182880" tIns="182880" rIns="182880" bIns="182880" rtlCol="0" anchor="t">
+            <a:normAutofit/>
+          </a:bodyPr>
+          <a:lstStyle>
+            <a:lvl1pPr algn="ctr" defTabSz="914400" rtl="0" eaLnBrk="1" latinLnBrk="0" hangingPunct="1">
+              <a:lnSpc>
+                <a:spcPct val="90000"/>
+              </a:lnSpc>
+              <a:spcBef>
+                <a:spcPct val="0"/>
+              </a:spcBef>
+              <a:buNone/>
+              <a:defRPr sz="2800" kern="1200" cap="all" spc="200" baseline="0">
+                <a:solidFill>
+                  <a:srgbClr val="262626"/>
+                </a:solidFill>
+                <a:latin typeface="+mj-lt"/>
+                <a:ea typeface="+mj-ea"/>
+                <a:cs typeface="+mj-cs"/>
+              </a:defRPr>
+            </a:lvl1pPr>
+          </a:lstStyle>
+          <a:p>
+            <a:pPr>
+              <a:tabLst>
+                <a:tab pos="180975" algn="l"/>
+                <a:tab pos="7177088" algn="r"/>
+              </a:tabLst>
+            </a:pPr>
+            <a:r>
+              <a:rPr lang="nl-NL" sz="2000" dirty="0" err="1">
+                <a:solidFill>
+                  <a:schemeClr val="tx1"/>
+                </a:solidFill>
+              </a:rPr>
+              <a:t>Relational</a:t>
+            </a:r>
+            <a:endParaRPr lang="en-GB" sz="2000" dirty="0">
+              <a:solidFill>
+                <a:schemeClr val="tx1"/>
+              </a:solidFill>
+            </a:endParaRPr>
+          </a:p>
+        </p:txBody>
+      </p:sp>
+      <p:sp>
+        <p:nvSpPr>
+          <p:cNvPr id="6" name="Titel 1">
+            <a:extLst>
+              <a:ext uri="{FF2B5EF4-FFF2-40B4-BE49-F238E27FC236}">
+                <a16:creationId xmlns:a16="http://schemas.microsoft.com/office/drawing/2014/main" id="{D85C03A9-87B0-4E10-B54E-A1CCFC4DDF38}"/>
+              </a:ext>
+            </a:extLst>
+          </p:cNvPr>
+          <p:cNvSpPr txBox="1">
+            <a:spLocks/>
+          </p:cNvSpPr>
+          <p:nvPr/>
+        </p:nvSpPr>
+        <p:spPr bwMode="black">
+          <a:xfrm>
+            <a:off x="4595831" y="1612580"/>
+            <a:ext cx="3240000" cy="4777587"/>
+          </a:xfrm>
+          <a:prstGeom prst="rect">
+            <a:avLst/>
+          </a:prstGeom>
+          <a:solidFill>
+            <a:schemeClr val="accent2">
+              <a:lumMod val="60000"/>
+              <a:lumOff val="40000"/>
+            </a:schemeClr>
+          </a:solidFill>
+          <a:ln w="31750" cap="sq">
+            <a:solidFill>
+              <a:srgbClr val="404040"/>
+            </a:solidFill>
+            <a:miter lim="800000"/>
+          </a:ln>
+        </p:spPr>
+        <p:txBody>
+          <a:bodyPr vert="horz" lIns="182880" tIns="182880" rIns="182880" bIns="182880" rtlCol="0" anchor="t">
+            <a:normAutofit/>
+          </a:bodyPr>
+          <a:lstStyle>
+            <a:lvl1pPr algn="ctr" defTabSz="914400" rtl="0" eaLnBrk="1" latinLnBrk="0" hangingPunct="1">
+              <a:lnSpc>
+                <a:spcPct val="90000"/>
+              </a:lnSpc>
+              <a:spcBef>
+                <a:spcPct val="0"/>
+              </a:spcBef>
+              <a:buNone/>
+              <a:defRPr sz="2800" kern="1200" cap="all" spc="200" baseline="0">
+                <a:solidFill>
+                  <a:srgbClr val="262626"/>
+                </a:solidFill>
+                <a:latin typeface="+mj-lt"/>
+                <a:ea typeface="+mj-ea"/>
+                <a:cs typeface="+mj-cs"/>
+              </a:defRPr>
+            </a:lvl1pPr>
+          </a:lstStyle>
+          <a:p>
+            <a:pPr>
+              <a:tabLst>
+                <a:tab pos="180975" algn="l"/>
+                <a:tab pos="7177088" algn="r"/>
+              </a:tabLst>
+            </a:pPr>
+            <a:r>
+              <a:rPr lang="nl-NL" sz="2000" dirty="0"/>
+              <a:t>Document-</a:t>
+            </a:r>
+            <a:r>
+              <a:rPr lang="nl-NL" sz="2000" dirty="0" err="1"/>
+              <a:t>based</a:t>
+            </a:r>
+            <a:endParaRPr lang="en-GB" sz="2000" dirty="0"/>
+          </a:p>
+        </p:txBody>
+      </p:sp>
+      <p:sp>
+        <p:nvSpPr>
+          <p:cNvPr id="7" name="Titel 1">
+            <a:extLst>
+              <a:ext uri="{FF2B5EF4-FFF2-40B4-BE49-F238E27FC236}">
+                <a16:creationId xmlns:a16="http://schemas.microsoft.com/office/drawing/2014/main" id="{11596790-3FBF-40C2-8EE2-4519DFAC4E79}"/>
+              </a:ext>
+            </a:extLst>
+          </p:cNvPr>
+          <p:cNvSpPr txBox="1">
+            <a:spLocks/>
+          </p:cNvSpPr>
+          <p:nvPr/>
+        </p:nvSpPr>
+        <p:spPr bwMode="black">
+          <a:xfrm>
+            <a:off x="7835831" y="1612580"/>
+            <a:ext cx="3240000" cy="4777587"/>
+          </a:xfrm>
+          <a:prstGeom prst="rect">
+            <a:avLst/>
+          </a:prstGeom>
+          <a:solidFill>
+            <a:schemeClr val="accent3"/>
+          </a:solidFill>
+          <a:ln w="31750" cap="sq">
+            <a:solidFill>
+              <a:srgbClr val="404040"/>
+            </a:solidFill>
+            <a:miter lim="800000"/>
+          </a:ln>
+        </p:spPr>
+        <p:txBody>
+          <a:bodyPr vert="horz" lIns="182880" tIns="182880" rIns="182880" bIns="182880" rtlCol="0" anchor="t">
+            <a:normAutofit/>
+          </a:bodyPr>
+          <a:lstStyle>
+            <a:lvl1pPr algn="ctr" defTabSz="914400" rtl="0" eaLnBrk="1" latinLnBrk="0" hangingPunct="1">
+              <a:lnSpc>
+                <a:spcPct val="90000"/>
+              </a:lnSpc>
+              <a:spcBef>
+                <a:spcPct val="0"/>
+              </a:spcBef>
+              <a:buNone/>
+              <a:defRPr sz="2800" kern="1200" cap="all" spc="200" baseline="0">
+                <a:solidFill>
+                  <a:srgbClr val="262626"/>
+                </a:solidFill>
+                <a:latin typeface="+mj-lt"/>
+                <a:ea typeface="+mj-ea"/>
+                <a:cs typeface="+mj-cs"/>
+              </a:defRPr>
+            </a:lvl1pPr>
+          </a:lstStyle>
+          <a:p>
+            <a:pPr>
+              <a:tabLst>
+                <a:tab pos="180975" algn="l"/>
+                <a:tab pos="7177088" algn="r"/>
+              </a:tabLst>
+            </a:pPr>
+            <a:r>
+              <a:rPr lang="nl-NL" sz="2000" dirty="0" err="1"/>
+              <a:t>Graph-based</a:t>
+            </a:r>
+            <a:endParaRPr lang="en-GB" sz="2000" dirty="0"/>
+          </a:p>
+        </p:txBody>
+      </p:sp>
+      <p:sp>
+        <p:nvSpPr>
+          <p:cNvPr id="65" name="Titel 1">
+            <a:extLst>
+              <a:ext uri="{FF2B5EF4-FFF2-40B4-BE49-F238E27FC236}">
+                <a16:creationId xmlns:a16="http://schemas.microsoft.com/office/drawing/2014/main" id="{C4073EF4-E47E-41B3-A5D9-8FDA72D94979}"/>
+              </a:ext>
+            </a:extLst>
+          </p:cNvPr>
+          <p:cNvSpPr txBox="1">
+            <a:spLocks/>
+          </p:cNvSpPr>
+          <p:nvPr/>
+        </p:nvSpPr>
+        <p:spPr bwMode="blackWhite">
+          <a:xfrm>
+            <a:off x="421494" y="6464599"/>
+            <a:ext cx="11578855" cy="293850"/>
+          </a:xfrm>
+          <a:prstGeom prst="rect">
+            <a:avLst/>
+          </a:prstGeom>
+          <a:solidFill>
+            <a:srgbClr val="FFFFFF"/>
+          </a:solidFill>
+          <a:ln w="38100" cap="sq">
+            <a:solidFill>
+              <a:srgbClr val="404040"/>
+            </a:solidFill>
+            <a:miter lim="800000"/>
+          </a:ln>
+        </p:spPr>
+        <p:txBody>
+          <a:bodyPr vert="horz" lIns="274320" tIns="182880" rIns="274320" bIns="182880" rtlCol="0" anchor="ctr" anchorCtr="1">
+            <a:normAutofit fontScale="25000" lnSpcReduction="20000"/>
+          </a:bodyPr>
+          <a:lstStyle>
+            <a:lvl1pPr algn="ctr" defTabSz="914400" rtl="0" eaLnBrk="1" latinLnBrk="0" hangingPunct="1">
+              <a:lnSpc>
+                <a:spcPct val="90000"/>
+              </a:lnSpc>
+              <a:spcBef>
+                <a:spcPct val="0"/>
+              </a:spcBef>
+              <a:buNone/>
+              <a:defRPr sz="3800" kern="1200" cap="all" spc="200" baseline="0">
+                <a:solidFill>
+                  <a:srgbClr val="262626"/>
+                </a:solidFill>
+                <a:latin typeface="+mj-lt"/>
+                <a:ea typeface="+mj-ea"/>
+                <a:cs typeface="+mj-cs"/>
+              </a:defRPr>
+            </a:lvl1pPr>
+          </a:lstStyle>
+          <a:p>
+            <a:pPr>
+              <a:tabLst>
+                <a:tab pos="361950" algn="l"/>
+                <a:tab pos="5475288" algn="ctr"/>
+                <a:tab pos="10313988" algn="r"/>
+              </a:tabLst>
+            </a:pPr>
+            <a:r>
+              <a:rPr lang="nl-NL" dirty="0"/>
+              <a:t>IN4331: Web Data Management – Development </a:t>
+            </a:r>
+            <a:r>
+              <a:rPr lang="nl-NL" dirty="0" err="1"/>
+              <a:t>Assignment</a:t>
+            </a:r>
+            <a:r>
+              <a:rPr lang="nl-NL" dirty="0"/>
+              <a:t> - Group 25	</a:t>
+            </a:r>
+            <a:fld id="{309AD0EB-97A9-44CC-874A-892D4CDC277E}" type="datetime2">
+              <a:rPr lang="en-GB" smtClean="0"/>
+              <a:t>Monday, 19 June 2017</a:t>
+            </a:fld>
+            <a:endParaRPr lang="en-GB" dirty="0"/>
+          </a:p>
+        </p:txBody>
+      </p:sp>
+      <p:grpSp>
+        <p:nvGrpSpPr>
+          <p:cNvPr id="35" name="Groep 34">
+            <a:extLst>
+              <a:ext uri="{FF2B5EF4-FFF2-40B4-BE49-F238E27FC236}">
+                <a16:creationId xmlns:a16="http://schemas.microsoft.com/office/drawing/2014/main" id="{0E4E04C9-E9D1-46D3-AAA2-64D8C93C8E3D}"/>
+              </a:ext>
+            </a:extLst>
+          </p:cNvPr>
+          <p:cNvGrpSpPr>
+            <a:grpSpLocks noChangeAspect="1"/>
+          </p:cNvGrpSpPr>
+          <p:nvPr/>
+        </p:nvGrpSpPr>
+        <p:grpSpPr>
+          <a:xfrm>
+            <a:off x="1529698" y="2978674"/>
+            <a:ext cx="2796362" cy="551344"/>
+            <a:chOff x="5518298" y="1102225"/>
+            <a:chExt cx="4633951" cy="913651"/>
+          </a:xfrm>
+        </p:grpSpPr>
+        <p:pic>
+          <p:nvPicPr>
+            <p:cNvPr id="36" name="Picture 4" descr="Afbeeldingsresultaat voor postgresql">
+              <a:extLst>
+                <a:ext uri="{FF2B5EF4-FFF2-40B4-BE49-F238E27FC236}">
+                  <a16:creationId xmlns:a16="http://schemas.microsoft.com/office/drawing/2014/main" id="{E7768734-CF16-4F33-8004-8B10FB5FBC72}"/>
+                </a:ext>
+              </a:extLst>
+            </p:cNvPr>
+            <p:cNvPicPr>
+              <a:picLocks noChangeAspect="1" noChangeArrowheads="1"/>
+            </p:cNvPicPr>
+            <p:nvPr/>
+          </p:nvPicPr>
+          <p:blipFill rotWithShape="1">
+            <a:blip r:embed="rId3">
+              <a:extLst>
+                <a:ext uri="{28A0092B-C50C-407E-A947-70E740481C1C}">
+                  <a14:useLocalDpi xmlns:a14="http://schemas.microsoft.com/office/drawing/2010/main" val="0"/>
+                </a:ext>
+              </a:extLst>
+            </a:blip>
+            <a:srcRect l="16301" t="11632" r="19162" b="30736"/>
+            <a:stretch/>
+          </p:blipFill>
+          <p:spPr bwMode="auto">
+            <a:xfrm>
+              <a:off x="5518298" y="1102225"/>
+              <a:ext cx="920817" cy="913651"/>
+            </a:xfrm>
+            <a:prstGeom prst="rect">
+              <a:avLst/>
+            </a:prstGeom>
+            <a:noFill/>
+            <a:extLst>
+              <a:ext uri="{909E8E84-426E-40DD-AFC4-6F175D3DCCD1}">
+                <a14:hiddenFill xmlns:a14="http://schemas.microsoft.com/office/drawing/2010/main">
+                  <a:solidFill>
+                    <a:srgbClr val="FFFFFF"/>
+                  </a:solidFill>
+                </a14:hiddenFill>
+              </a:ext>
+            </a:extLst>
+          </p:spPr>
+        </p:pic>
+        <p:pic>
+          <p:nvPicPr>
+            <p:cNvPr id="37" name="Picture 4" descr="Afbeeldingsresultaat voor postgresql">
+              <a:extLst>
+                <a:ext uri="{FF2B5EF4-FFF2-40B4-BE49-F238E27FC236}">
+                  <a16:creationId xmlns:a16="http://schemas.microsoft.com/office/drawing/2014/main" id="{4D803605-83C5-4380-9296-265AC2FEC84B}"/>
+                </a:ext>
+              </a:extLst>
+            </p:cNvPr>
+            <p:cNvPicPr>
+              <a:picLocks noChangeAspect="1" noChangeArrowheads="1"/>
+            </p:cNvPicPr>
+            <p:nvPr/>
+          </p:nvPicPr>
+          <p:blipFill rotWithShape="1">
+            <a:blip r:embed="rId4">
+              <a:extLst>
+                <a:ext uri="{BEBA8EAE-BF5A-486C-A8C5-ECC9F3942E4B}">
+                  <a14:imgProps xmlns:a14="http://schemas.microsoft.com/office/drawing/2010/main">
+                    <a14:imgLayer r:embed="rId5">
+                      <a14:imgEffect>
+                        <a14:brightnessContrast bright="100000" contrast="100000"/>
+                      </a14:imgEffect>
+                    </a14:imgLayer>
+                  </a14:imgProps>
+                </a:ext>
+                <a:ext uri="{28A0092B-C50C-407E-A947-70E740481C1C}">
+                  <a14:useLocalDpi xmlns:a14="http://schemas.microsoft.com/office/drawing/2010/main" val="0"/>
+                </a:ext>
+              </a:extLst>
+            </a:blip>
+            <a:srcRect t="74733" b="10380"/>
+            <a:stretch/>
+          </p:blipFill>
+          <p:spPr bwMode="auto">
+            <a:xfrm>
+              <a:off x="6215831" y="1233490"/>
+              <a:ext cx="3936418" cy="651123"/>
+            </a:xfrm>
+            <a:prstGeom prst="rect">
+              <a:avLst/>
+            </a:prstGeom>
+            <a:noFill/>
+            <a:extLst>
+              <a:ext uri="{909E8E84-426E-40DD-AFC4-6F175D3DCCD1}">
+                <a14:hiddenFill xmlns:a14="http://schemas.microsoft.com/office/drawing/2010/main">
+                  <a:solidFill>
+                    <a:srgbClr val="FFFFFF"/>
+                  </a:solidFill>
+                </a14:hiddenFill>
+              </a:ext>
+            </a:extLst>
+          </p:spPr>
+        </p:pic>
+      </p:grpSp>
+      <p:pic>
+        <p:nvPicPr>
+          <p:cNvPr id="38" name="Afbeelding 37">
+            <a:extLst>
+              <a:ext uri="{FF2B5EF4-FFF2-40B4-BE49-F238E27FC236}">
+                <a16:creationId xmlns:a16="http://schemas.microsoft.com/office/drawing/2014/main" id="{C58647B4-9750-4906-972C-BE320E35B9E2}"/>
+              </a:ext>
+            </a:extLst>
+          </p:cNvPr>
+          <p:cNvPicPr>
+            <a:picLocks noChangeAspect="1"/>
+          </p:cNvPicPr>
+          <p:nvPr/>
+        </p:nvPicPr>
+        <p:blipFill>
+          <a:blip r:embed="rId6">
+            <a:extLst>
+              <a:ext uri="{96DAC541-7B7A-43D3-8B79-37D633B846F1}">
+                <asvg:svgBlip xmlns:asvg="http://schemas.microsoft.com/office/drawing/2016/SVG/main" r:embed="rId7"/>
+              </a:ext>
+            </a:extLst>
+          </a:blip>
+          <a:stretch>
+            <a:fillRect/>
+          </a:stretch>
+        </p:blipFill>
+        <p:spPr>
+          <a:xfrm>
+            <a:off x="5235228" y="2882088"/>
+            <a:ext cx="2122607" cy="605367"/>
+          </a:xfrm>
+          <a:prstGeom prst="rect">
+            <a:avLst/>
+          </a:prstGeom>
+        </p:spPr>
+      </p:pic>
+      <p:pic>
+        <p:nvPicPr>
+          <p:cNvPr id="39" name="Picture 8" descr="https://s3.amazonaws.com/dev.assets.neo4j.com/wp-content/uploads/20140926224303/neo4j_logo-facebook.png">
+            <a:extLst>
+              <a:ext uri="{FF2B5EF4-FFF2-40B4-BE49-F238E27FC236}">
+                <a16:creationId xmlns:a16="http://schemas.microsoft.com/office/drawing/2014/main" id="{76FDC220-2B3F-4746-A4D2-9CFDACDFA4C7}"/>
+              </a:ext>
+            </a:extLst>
+          </p:cNvPr>
+          <p:cNvPicPr>
+            <a:picLocks noChangeAspect="1" noChangeArrowheads="1"/>
+          </p:cNvPicPr>
+          <p:nvPr/>
+        </p:nvPicPr>
+        <p:blipFill>
+          <a:blip r:embed="rId8">
+            <a:extLst>
+              <a:ext uri="{28A0092B-C50C-407E-A947-70E740481C1C}">
+                <a14:useLocalDpi xmlns:a14="http://schemas.microsoft.com/office/drawing/2010/main" val="0"/>
+              </a:ext>
+            </a:extLst>
+          </a:blip>
+          <a:srcRect/>
+          <a:stretch>
+            <a:fillRect/>
+          </a:stretch>
+        </p:blipFill>
+        <p:spPr bwMode="auto">
+          <a:xfrm>
+            <a:off x="8586976" y="2801300"/>
+            <a:ext cx="1737710" cy="906092"/>
+          </a:xfrm>
+          <a:prstGeom prst="rect">
+            <a:avLst/>
+          </a:prstGeom>
+          <a:noFill/>
+          <a:extLst>
+            <a:ext uri="{909E8E84-426E-40DD-AFC4-6F175D3DCCD1}">
+              <a14:hiddenFill xmlns:a14="http://schemas.microsoft.com/office/drawing/2010/main">
+                <a:solidFill>
+                  <a:srgbClr val="FFFFFF"/>
+                </a:solidFill>
+              </a14:hiddenFill>
+            </a:ext>
+          </a:extLst>
+        </p:spPr>
+      </p:pic>
+      <p:sp>
+        <p:nvSpPr>
+          <p:cNvPr id="18" name="Titel 1">
+            <a:extLst>
+              <a:ext uri="{FF2B5EF4-FFF2-40B4-BE49-F238E27FC236}">
+                <a16:creationId xmlns:a16="http://schemas.microsoft.com/office/drawing/2014/main" id="{C4026E3D-245B-4C6D-9203-5A3640B2B4A6}"/>
+              </a:ext>
+            </a:extLst>
+          </p:cNvPr>
+          <p:cNvSpPr txBox="1">
+            <a:spLocks/>
+          </p:cNvSpPr>
+          <p:nvPr/>
+        </p:nvSpPr>
+        <p:spPr bwMode="black">
+          <a:xfrm>
+            <a:off x="1355831" y="5073487"/>
+            <a:ext cx="9720000" cy="1353896"/>
+          </a:xfrm>
+          <a:prstGeom prst="rect">
+            <a:avLst/>
+          </a:prstGeom>
+          <a:solidFill>
+            <a:srgbClr val="FFD5A7"/>
+          </a:solidFill>
+          <a:ln w="31750" cap="sq">
+            <a:solidFill>
+              <a:srgbClr val="404040"/>
+            </a:solidFill>
+            <a:miter lim="800000"/>
+          </a:ln>
+        </p:spPr>
+        <p:txBody>
+          <a:bodyPr vert="horz" lIns="182880" tIns="182880" rIns="182880" bIns="182880" rtlCol="0" anchor="t">
+            <a:normAutofit/>
+          </a:bodyPr>
+          <a:lstStyle>
+            <a:lvl1pPr algn="ctr" defTabSz="914400" rtl="0" eaLnBrk="1" latinLnBrk="0" hangingPunct="1">
+              <a:lnSpc>
+                <a:spcPct val="90000"/>
+              </a:lnSpc>
+              <a:spcBef>
+                <a:spcPct val="0"/>
+              </a:spcBef>
+              <a:buNone/>
+              <a:defRPr sz="2800" kern="1200" cap="all" spc="200" baseline="0">
+                <a:solidFill>
+                  <a:srgbClr val="262626"/>
+                </a:solidFill>
+                <a:latin typeface="+mj-lt"/>
+                <a:ea typeface="+mj-ea"/>
+                <a:cs typeface="+mj-cs"/>
+              </a:defRPr>
+            </a:lvl1pPr>
+          </a:lstStyle>
+          <a:p>
+            <a:pPr>
+              <a:tabLst>
+                <a:tab pos="1169988" algn="l"/>
+                <a:tab pos="7177088" algn="r"/>
+              </a:tabLst>
+            </a:pPr>
+            <a:r>
+              <a:rPr lang="nl-NL" sz="3600" dirty="0"/>
+              <a:t>       Postman	</a:t>
+            </a:r>
+            <a:endParaRPr lang="en-GB" sz="3600" dirty="0"/>
+          </a:p>
+        </p:txBody>
+      </p:sp>
+      <p:pic>
+        <p:nvPicPr>
+          <p:cNvPr id="1026" name="Picture 2" descr="Afbeeldingsresultaat voor postman">
+            <a:extLst>
+              <a:ext uri="{FF2B5EF4-FFF2-40B4-BE49-F238E27FC236}">
+                <a16:creationId xmlns:a16="http://schemas.microsoft.com/office/drawing/2014/main" id="{97FC96B5-C33E-40E0-83E1-B35A20371FE9}"/>
+              </a:ext>
+            </a:extLst>
+          </p:cNvPr>
+          <p:cNvPicPr>
+            <a:picLocks noChangeAspect="1" noChangeArrowheads="1"/>
+          </p:cNvPicPr>
+          <p:nvPr/>
+        </p:nvPicPr>
+        <p:blipFill>
+          <a:blip r:embed="rId9">
+            <a:extLst>
+              <a:ext uri="{28A0092B-C50C-407E-A947-70E740481C1C}">
+                <a14:useLocalDpi xmlns:a14="http://schemas.microsoft.com/office/drawing/2010/main" val="0"/>
+              </a:ext>
+            </a:extLst>
+          </a:blip>
+          <a:srcRect/>
+          <a:stretch>
+            <a:fillRect/>
+          </a:stretch>
+        </p:blipFill>
+        <p:spPr bwMode="auto">
+          <a:xfrm>
+            <a:off x="6903951" y="4526407"/>
+            <a:ext cx="1863760" cy="1863760"/>
+          </a:xfrm>
+          <a:prstGeom prst="rect">
+            <a:avLst/>
+          </a:prstGeom>
+          <a:noFill/>
+          <a:extLst>
+            <a:ext uri="{909E8E84-426E-40DD-AFC4-6F175D3DCCD1}">
+              <a14:hiddenFill xmlns:a14="http://schemas.microsoft.com/office/drawing/2010/main">
+                <a:solidFill>
+                  <a:srgbClr val="FFFFFF"/>
+                </a:solidFill>
+              </a14:hiddenFill>
+            </a:ext>
+          </a:extLst>
+        </p:spPr>
+      </p:pic>
+    </p:spTree>
+    <p:extLst>
+      <p:ext uri="{BB962C8B-B14F-4D97-AF65-F5344CB8AC3E}">
+        <p14:creationId xmlns:p14="http://schemas.microsoft.com/office/powerpoint/2010/main" val="1730365101"/>
+      </p:ext>
+    </p:extLst>
+  </p:cSld>
+  <p:clrMapOvr>
+    <a:masterClrMapping/>
+  </p:clrMapOvr>
+</p:sld>
+</file>
+
+<file path=ppt/slides/slide5.xml><?xml version="1.0" encoding="utf-8"?>
+<p:sld xmlns:a="http://schemas.openxmlformats.org/drawingml/2006/main" xmlns:r="http://schemas.openxmlformats.org/officeDocument/2006/relationships" xmlns:p="http://schemas.openxmlformats.org/presentationml/2006/main">
+  <p:cSld>
+    <p:spTree>
+      <p:nvGrpSpPr>
+        <p:cNvPr id="1" name=""/>
+        <p:cNvGrpSpPr/>
+        <p:nvPr/>
+      </p:nvGrpSpPr>
+      <p:grpSpPr>
+        <a:xfrm>
+          <a:off x="0" y="0"/>
+          <a:ext cx="0" cy="0"/>
+          <a:chOff x="0" y="0"/>
+          <a:chExt cx="0" cy="0"/>
+        </a:xfrm>
+      </p:grpSpPr>
+      <p:sp>
+        <p:nvSpPr>
           <p:cNvPr id="5" name="Titel 1">
             <a:extLst>
               <a:ext uri="{FF2B5EF4-FFF2-40B4-BE49-F238E27FC236}">
@@ -9151,7 +10246,7 @@
 </p:sld>
 </file>
 
-<file path=ppt/slides/slide5.xml><?xml version="1.0" encoding="utf-8"?>
+<file path=ppt/slides/slide6.xml><?xml version="1.0" encoding="utf-8"?>
 <p:sld xmlns:a="http://schemas.openxmlformats.org/drawingml/2006/main" xmlns:r="http://schemas.openxmlformats.org/officeDocument/2006/relationships" xmlns:p="http://schemas.openxmlformats.org/presentationml/2006/main">
   <p:cSld>
     <p:spTree>
@@ -9227,73 +10322,107 @@
             </a:lvl1pPr>
           </a:lstStyle>
           <a:p>
+            <a:pPr algn="l"/>
+            <a:r>
+              <a:rPr lang="nl-NL" sz="2000" cap="none" dirty="0"/>
+              <a:t>Pre-processing</a:t>
+            </a:r>
+            <a:endParaRPr lang="en-GB" sz="2000" cap="none" dirty="0"/>
+          </a:p>
+          <a:p>
             <a:pPr marL="342900" indent="-342900" algn="l">
               <a:buFont typeface="Arial" panose="020B0604020202020204" pitchFamily="34" charset="0"/>
               <a:buChar char="•"/>
-              <a:tabLst>
-                <a:tab pos="627063" algn="l"/>
-                <a:tab pos="7177088" algn="r"/>
-              </a:tabLst>
             </a:pPr>
             <a:r>
-              <a:rPr lang="nl-NL" sz="2000" dirty="0">
-                <a:solidFill>
-                  <a:schemeClr val="bg1"/>
-                </a:solidFill>
-                <a:latin typeface="+mn-lt"/>
-              </a:rPr>
-              <a:t>Pre-processing</a:t>
+              <a:rPr lang="en-GB" sz="2000" cap="none" dirty="0"/>
+              <a:t>Export csv files from PostgreSQL with joined tables</a:t>
             </a:r>
           </a:p>
           <a:p>
             <a:pPr marL="342900" indent="-342900" algn="l">
               <a:buFont typeface="Arial" panose="020B0604020202020204" pitchFamily="34" charset="0"/>
               <a:buChar char="•"/>
-              <a:tabLst>
-                <a:tab pos="627063" algn="l"/>
-                <a:tab pos="7177088" algn="r"/>
-              </a:tabLst>
             </a:pPr>
             <a:r>
-              <a:rPr lang="nl-NL" sz="2000" dirty="0" err="1">
-                <a:solidFill>
-                  <a:schemeClr val="bg1"/>
-                </a:solidFill>
-                <a:latin typeface="+mn-lt"/>
-              </a:rPr>
-              <a:t>Implementation</a:t>
-            </a:r>
-            <a:endParaRPr lang="nl-NL" sz="2000" dirty="0">
-              <a:solidFill>
-                <a:schemeClr val="bg1"/>
-              </a:solidFill>
-              <a:latin typeface="+mn-lt"/>
-            </a:endParaRPr>
+              <a:rPr lang="en-GB" sz="2000" cap="none" dirty="0"/>
+              <a:t>Import csv files to MongoDB using </a:t>
+            </a:r>
+            <a:r>
+              <a:rPr lang="en-GB" sz="2000" cap="none" dirty="0" err="1"/>
+              <a:t>Pyhton</a:t>
+            </a:r>
+            <a:r>
+              <a:rPr lang="en-GB" sz="2000" cap="none" dirty="0"/>
+              <a:t> scripts</a:t>
+            </a:r>
           </a:p>
           <a:p>
             <a:pPr marL="342900" indent="-342900" algn="l">
               <a:buFont typeface="Arial" panose="020B0604020202020204" pitchFamily="34" charset="0"/>
               <a:buChar char="•"/>
-              <a:tabLst>
-                <a:tab pos="627063" algn="l"/>
-                <a:tab pos="7177088" algn="r"/>
-              </a:tabLst>
             </a:pPr>
             <a:r>
-              <a:rPr lang="nl-NL" sz="2000" dirty="0" err="1">
-                <a:solidFill>
-                  <a:schemeClr val="bg1"/>
-                </a:solidFill>
-                <a:latin typeface="+mn-lt"/>
-              </a:rPr>
-              <a:t>Experience</a:t>
-            </a:r>
-            <a:endParaRPr lang="en-GB" sz="2000" dirty="0">
-              <a:solidFill>
-                <a:schemeClr val="bg1"/>
-              </a:solidFill>
-              <a:latin typeface="+mn-lt"/>
-            </a:endParaRPr>
+              <a:rPr lang="en-GB" sz="2000" cap="none" dirty="0"/>
+              <a:t>Create indexes to speed up access to the database</a:t>
+            </a:r>
+          </a:p>
+          <a:p>
+            <a:pPr marL="342900" indent="-342900" algn="l">
+              <a:buFont typeface="Arial" panose="020B0604020202020204" pitchFamily="34" charset="0"/>
+              <a:buChar char="•"/>
+            </a:pPr>
+            <a:endParaRPr lang="nl-NL" sz="2000" cap="none" dirty="0"/>
+          </a:p>
+          <a:p>
+            <a:pPr algn="l"/>
+            <a:r>
+              <a:rPr lang="nl-NL" sz="2000" cap="none" dirty="0" err="1"/>
+              <a:t>Implementation</a:t>
+            </a:r>
+            <a:endParaRPr lang="nl-NL" sz="2000" cap="none" dirty="0"/>
+          </a:p>
+          <a:p>
+            <a:pPr algn="l"/>
+            <a:r>
+              <a:rPr lang="en-GB" sz="2000" cap="none" dirty="0"/>
+              <a:t>2 types of queries were used </a:t>
+            </a:r>
+          </a:p>
+          <a:p>
+            <a:pPr marL="342900" indent="-342900" algn="l">
+              <a:buFont typeface="Arial" panose="020B0604020202020204" pitchFamily="34" charset="0"/>
+              <a:buChar char="•"/>
+            </a:pPr>
+            <a:r>
+              <a:rPr lang="nl-NL" sz="2000" cap="none" dirty="0"/>
+              <a:t>Search </a:t>
+            </a:r>
+            <a:r>
+              <a:rPr lang="en-GB" sz="2000" cap="none" dirty="0"/>
+              <a:t>query</a:t>
+            </a:r>
+          </a:p>
+          <a:p>
+            <a:pPr marL="342900" indent="-342900" algn="l">
+              <a:buFont typeface="Arial" panose="020B0604020202020204" pitchFamily="34" charset="0"/>
+              <a:buChar char="•"/>
+            </a:pPr>
+            <a:r>
+              <a:rPr lang="en-GB" sz="2000" cap="none" dirty="0"/>
+              <a:t>bulk query to retrieve the wanted documents IDs</a:t>
+            </a:r>
+          </a:p>
+          <a:p>
+            <a:pPr algn="l"/>
+            <a:endParaRPr lang="en-GB" sz="2000" cap="none" dirty="0"/>
+          </a:p>
+          <a:p>
+            <a:pPr marL="342900" indent="-342900" algn="l">
+              <a:buFont typeface="Arial" panose="020B0604020202020204" pitchFamily="34" charset="0"/>
+              <a:buChar char="•"/>
+            </a:pPr>
+            <a:endParaRPr lang="en-GB" sz="2000" cap="none" dirty="0"/>
           </a:p>
         </p:txBody>
       </p:sp>
@@ -9485,7 +10614,7 @@
 </p:sld>
 </file>
 
-<file path=ppt/slides/slide6.xml><?xml version="1.0" encoding="utf-8"?>
+<file path=ppt/slides/slide7.xml><?xml version="1.0" encoding="utf-8"?>
 <p:sld xmlns:a="http://schemas.openxmlformats.org/drawingml/2006/main" xmlns:r="http://schemas.openxmlformats.org/officeDocument/2006/relationships" xmlns:p="http://schemas.openxmlformats.org/presentationml/2006/main">
   <p:cSld>
     <p:spTree>
@@ -9827,7 +10956,703 @@
 </p:sld>
 </file>
 
-<file path=ppt/slides/slide7.xml><?xml version="1.0" encoding="utf-8"?>
+<file path=ppt/slides/slide8.xml><?xml version="1.0" encoding="utf-8"?>
+<p:sld xmlns:a="http://schemas.openxmlformats.org/drawingml/2006/main" xmlns:r="http://schemas.openxmlformats.org/officeDocument/2006/relationships" xmlns:p="http://schemas.openxmlformats.org/presentationml/2006/main">
+  <p:cSld>
+    <p:spTree>
+      <p:nvGrpSpPr>
+        <p:cNvPr id="1" name=""/>
+        <p:cNvGrpSpPr/>
+        <p:nvPr/>
+      </p:nvGrpSpPr>
+      <p:grpSpPr>
+        <a:xfrm>
+          <a:off x="0" y="0"/>
+          <a:ext cx="0" cy="0"/>
+          <a:chOff x="0" y="0"/>
+          <a:chExt cx="0" cy="0"/>
+        </a:xfrm>
+      </p:grpSpPr>
+      <p:sp>
+        <p:nvSpPr>
+          <p:cNvPr id="4" name="Titel 1">
+            <a:extLst>
+              <a:ext uri="{FF2B5EF4-FFF2-40B4-BE49-F238E27FC236}">
+                <a16:creationId xmlns:a16="http://schemas.microsoft.com/office/drawing/2014/main" id="{C8ABB5EF-8E57-4EEB-9736-2500EE5C4F25}"/>
+              </a:ext>
+            </a:extLst>
+          </p:cNvPr>
+          <p:cNvSpPr txBox="1">
+            <a:spLocks/>
+          </p:cNvSpPr>
+          <p:nvPr/>
+        </p:nvSpPr>
+        <p:spPr bwMode="black">
+          <a:xfrm>
+            <a:off x="1355831" y="423860"/>
+            <a:ext cx="9720000" cy="1188720"/>
+          </a:xfrm>
+          <a:prstGeom prst="rect">
+            <a:avLst/>
+          </a:prstGeom>
+          <a:solidFill>
+            <a:schemeClr val="accent5">
+              <a:lumMod val="60000"/>
+              <a:lumOff val="40000"/>
+            </a:schemeClr>
+          </a:solidFill>
+          <a:ln w="31750" cap="sq">
+            <a:solidFill>
+              <a:srgbClr val="404040"/>
+            </a:solidFill>
+            <a:miter lim="800000"/>
+          </a:ln>
+        </p:spPr>
+        <p:txBody>
+          <a:bodyPr vert="horz" lIns="182880" tIns="182880" rIns="182880" bIns="182880" rtlCol="0" anchor="ctr">
+            <a:normAutofit/>
+          </a:bodyPr>
+          <a:lstStyle>
+            <a:lvl1pPr algn="ctr" defTabSz="914400" rtl="0" eaLnBrk="1" latinLnBrk="0" hangingPunct="1">
+              <a:lnSpc>
+                <a:spcPct val="90000"/>
+              </a:lnSpc>
+              <a:spcBef>
+                <a:spcPct val="0"/>
+              </a:spcBef>
+              <a:buNone/>
+              <a:defRPr sz="2800" kern="1200" cap="all" spc="200" baseline="0">
+                <a:solidFill>
+                  <a:srgbClr val="262626"/>
+                </a:solidFill>
+                <a:latin typeface="+mj-lt"/>
+                <a:ea typeface="+mj-ea"/>
+                <a:cs typeface="+mj-cs"/>
+              </a:defRPr>
+            </a:lvl1pPr>
+          </a:lstStyle>
+          <a:p>
+            <a:pPr>
+              <a:tabLst>
+                <a:tab pos="180975" algn="l"/>
+                <a:tab pos="7177088" algn="r"/>
+              </a:tabLst>
+            </a:pPr>
+            <a:r>
+              <a:rPr lang="nl-NL" sz="3600" dirty="0" err="1"/>
+              <a:t>Experience</a:t>
+            </a:r>
+            <a:endParaRPr lang="en-GB" sz="3600" dirty="0"/>
+          </a:p>
+        </p:txBody>
+      </p:sp>
+      <p:sp>
+        <p:nvSpPr>
+          <p:cNvPr id="5" name="Titel 1">
+            <a:extLst>
+              <a:ext uri="{FF2B5EF4-FFF2-40B4-BE49-F238E27FC236}">
+                <a16:creationId xmlns:a16="http://schemas.microsoft.com/office/drawing/2014/main" id="{249E61C2-B78A-48F8-9322-E2F850FC5B26}"/>
+              </a:ext>
+            </a:extLst>
+          </p:cNvPr>
+          <p:cNvSpPr txBox="1">
+            <a:spLocks/>
+          </p:cNvSpPr>
+          <p:nvPr/>
+        </p:nvSpPr>
+        <p:spPr bwMode="black">
+          <a:xfrm>
+            <a:off x="1355831" y="1612580"/>
+            <a:ext cx="3240000" cy="4777587"/>
+          </a:xfrm>
+          <a:prstGeom prst="rect">
+            <a:avLst/>
+          </a:prstGeom>
+          <a:solidFill>
+            <a:schemeClr val="accent1"/>
+          </a:solidFill>
+          <a:ln w="31750" cap="sq">
+            <a:solidFill>
+              <a:srgbClr val="404040"/>
+            </a:solidFill>
+            <a:miter lim="800000"/>
+          </a:ln>
+        </p:spPr>
+        <p:txBody>
+          <a:bodyPr vert="horz" lIns="182880" tIns="182880" rIns="182880" bIns="182880" rtlCol="0" anchor="t">
+            <a:normAutofit/>
+          </a:bodyPr>
+          <a:lstStyle>
+            <a:lvl1pPr algn="ctr" defTabSz="914400" rtl="0" eaLnBrk="1" latinLnBrk="0" hangingPunct="1">
+              <a:lnSpc>
+                <a:spcPct val="90000"/>
+              </a:lnSpc>
+              <a:spcBef>
+                <a:spcPct val="0"/>
+              </a:spcBef>
+              <a:buNone/>
+              <a:defRPr sz="2800" kern="1200" cap="all" spc="200" baseline="0">
+                <a:solidFill>
+                  <a:srgbClr val="262626"/>
+                </a:solidFill>
+                <a:latin typeface="+mj-lt"/>
+                <a:ea typeface="+mj-ea"/>
+                <a:cs typeface="+mj-cs"/>
+              </a:defRPr>
+            </a:lvl1pPr>
+          </a:lstStyle>
+          <a:p>
+            <a:pPr>
+              <a:tabLst>
+                <a:tab pos="180975" algn="l"/>
+                <a:tab pos="7177088" algn="r"/>
+              </a:tabLst>
+            </a:pPr>
+            <a:r>
+              <a:rPr lang="nl-NL" sz="2000" dirty="0" err="1">
+                <a:solidFill>
+                  <a:schemeClr val="tx1"/>
+                </a:solidFill>
+              </a:rPr>
+              <a:t>Relational</a:t>
+            </a:r>
+            <a:endParaRPr lang="en-GB" sz="2000" dirty="0">
+              <a:solidFill>
+                <a:schemeClr val="tx1"/>
+              </a:solidFill>
+            </a:endParaRPr>
+          </a:p>
+        </p:txBody>
+      </p:sp>
+      <p:sp>
+        <p:nvSpPr>
+          <p:cNvPr id="6" name="Titel 1">
+            <a:extLst>
+              <a:ext uri="{FF2B5EF4-FFF2-40B4-BE49-F238E27FC236}">
+                <a16:creationId xmlns:a16="http://schemas.microsoft.com/office/drawing/2014/main" id="{D85C03A9-87B0-4E10-B54E-A1CCFC4DDF38}"/>
+              </a:ext>
+            </a:extLst>
+          </p:cNvPr>
+          <p:cNvSpPr txBox="1">
+            <a:spLocks/>
+          </p:cNvSpPr>
+          <p:nvPr/>
+        </p:nvSpPr>
+        <p:spPr bwMode="black">
+          <a:xfrm>
+            <a:off x="4595831" y="1612580"/>
+            <a:ext cx="3240000" cy="4777587"/>
+          </a:xfrm>
+          <a:prstGeom prst="rect">
+            <a:avLst/>
+          </a:prstGeom>
+          <a:solidFill>
+            <a:schemeClr val="accent2">
+              <a:lumMod val="60000"/>
+              <a:lumOff val="40000"/>
+            </a:schemeClr>
+          </a:solidFill>
+          <a:ln w="31750" cap="sq">
+            <a:solidFill>
+              <a:srgbClr val="404040"/>
+            </a:solidFill>
+            <a:miter lim="800000"/>
+          </a:ln>
+        </p:spPr>
+        <p:txBody>
+          <a:bodyPr vert="horz" lIns="182880" tIns="182880" rIns="182880" bIns="182880" rtlCol="0" anchor="t">
+            <a:normAutofit/>
+          </a:bodyPr>
+          <a:lstStyle>
+            <a:lvl1pPr algn="ctr" defTabSz="914400" rtl="0" eaLnBrk="1" latinLnBrk="0" hangingPunct="1">
+              <a:lnSpc>
+                <a:spcPct val="90000"/>
+              </a:lnSpc>
+              <a:spcBef>
+                <a:spcPct val="0"/>
+              </a:spcBef>
+              <a:buNone/>
+              <a:defRPr sz="2800" kern="1200" cap="all" spc="200" baseline="0">
+                <a:solidFill>
+                  <a:srgbClr val="262626"/>
+                </a:solidFill>
+                <a:latin typeface="+mj-lt"/>
+                <a:ea typeface="+mj-ea"/>
+                <a:cs typeface="+mj-cs"/>
+              </a:defRPr>
+            </a:lvl1pPr>
+          </a:lstStyle>
+          <a:p>
+            <a:pPr>
+              <a:tabLst>
+                <a:tab pos="180975" algn="l"/>
+                <a:tab pos="7177088" algn="r"/>
+              </a:tabLst>
+            </a:pPr>
+            <a:r>
+              <a:rPr lang="nl-NL" sz="2000" dirty="0"/>
+              <a:t>Document-</a:t>
+            </a:r>
+            <a:r>
+              <a:rPr lang="nl-NL" sz="2000" dirty="0" err="1"/>
+              <a:t>based</a:t>
+            </a:r>
+            <a:endParaRPr lang="en-GB" sz="2000" dirty="0"/>
+          </a:p>
+        </p:txBody>
+      </p:sp>
+      <p:sp>
+        <p:nvSpPr>
+          <p:cNvPr id="7" name="Titel 1">
+            <a:extLst>
+              <a:ext uri="{FF2B5EF4-FFF2-40B4-BE49-F238E27FC236}">
+                <a16:creationId xmlns:a16="http://schemas.microsoft.com/office/drawing/2014/main" id="{11596790-3FBF-40C2-8EE2-4519DFAC4E79}"/>
+              </a:ext>
+            </a:extLst>
+          </p:cNvPr>
+          <p:cNvSpPr txBox="1">
+            <a:spLocks/>
+          </p:cNvSpPr>
+          <p:nvPr/>
+        </p:nvSpPr>
+        <p:spPr bwMode="black">
+          <a:xfrm>
+            <a:off x="7835831" y="1612580"/>
+            <a:ext cx="3240000" cy="4777587"/>
+          </a:xfrm>
+          <a:prstGeom prst="rect">
+            <a:avLst/>
+          </a:prstGeom>
+          <a:solidFill>
+            <a:schemeClr val="accent3"/>
+          </a:solidFill>
+          <a:ln w="31750" cap="sq">
+            <a:solidFill>
+              <a:srgbClr val="404040"/>
+            </a:solidFill>
+            <a:miter lim="800000"/>
+          </a:ln>
+        </p:spPr>
+        <p:txBody>
+          <a:bodyPr vert="horz" lIns="182880" tIns="182880" rIns="182880" bIns="182880" rtlCol="0" anchor="t">
+            <a:normAutofit/>
+          </a:bodyPr>
+          <a:lstStyle>
+            <a:lvl1pPr algn="ctr" defTabSz="914400" rtl="0" eaLnBrk="1" latinLnBrk="0" hangingPunct="1">
+              <a:lnSpc>
+                <a:spcPct val="90000"/>
+              </a:lnSpc>
+              <a:spcBef>
+                <a:spcPct val="0"/>
+              </a:spcBef>
+              <a:buNone/>
+              <a:defRPr sz="2800" kern="1200" cap="all" spc="200" baseline="0">
+                <a:solidFill>
+                  <a:srgbClr val="262626"/>
+                </a:solidFill>
+                <a:latin typeface="+mj-lt"/>
+                <a:ea typeface="+mj-ea"/>
+                <a:cs typeface="+mj-cs"/>
+              </a:defRPr>
+            </a:lvl1pPr>
+          </a:lstStyle>
+          <a:p>
+            <a:pPr>
+              <a:tabLst>
+                <a:tab pos="180975" algn="l"/>
+                <a:tab pos="7177088" algn="r"/>
+              </a:tabLst>
+            </a:pPr>
+            <a:r>
+              <a:rPr lang="nl-NL" sz="2000" dirty="0" err="1"/>
+              <a:t>Graph-based</a:t>
+            </a:r>
+            <a:endParaRPr lang="en-GB" sz="2000" dirty="0"/>
+          </a:p>
+        </p:txBody>
+      </p:sp>
+      <p:sp>
+        <p:nvSpPr>
+          <p:cNvPr id="65" name="Titel 1">
+            <a:extLst>
+              <a:ext uri="{FF2B5EF4-FFF2-40B4-BE49-F238E27FC236}">
+                <a16:creationId xmlns:a16="http://schemas.microsoft.com/office/drawing/2014/main" id="{C4073EF4-E47E-41B3-A5D9-8FDA72D94979}"/>
+              </a:ext>
+            </a:extLst>
+          </p:cNvPr>
+          <p:cNvSpPr txBox="1">
+            <a:spLocks/>
+          </p:cNvSpPr>
+          <p:nvPr/>
+        </p:nvSpPr>
+        <p:spPr bwMode="blackWhite">
+          <a:xfrm>
+            <a:off x="421494" y="6464599"/>
+            <a:ext cx="11578855" cy="293850"/>
+          </a:xfrm>
+          <a:prstGeom prst="rect">
+            <a:avLst/>
+          </a:prstGeom>
+          <a:solidFill>
+            <a:srgbClr val="FFFFFF"/>
+          </a:solidFill>
+          <a:ln w="38100" cap="sq">
+            <a:solidFill>
+              <a:srgbClr val="404040"/>
+            </a:solidFill>
+            <a:miter lim="800000"/>
+          </a:ln>
+        </p:spPr>
+        <p:txBody>
+          <a:bodyPr vert="horz" lIns="274320" tIns="182880" rIns="274320" bIns="182880" rtlCol="0" anchor="ctr" anchorCtr="1">
+            <a:normAutofit fontScale="25000" lnSpcReduction="20000"/>
+          </a:bodyPr>
+          <a:lstStyle>
+            <a:lvl1pPr algn="ctr" defTabSz="914400" rtl="0" eaLnBrk="1" latinLnBrk="0" hangingPunct="1">
+              <a:lnSpc>
+                <a:spcPct val="90000"/>
+              </a:lnSpc>
+              <a:spcBef>
+                <a:spcPct val="0"/>
+              </a:spcBef>
+              <a:buNone/>
+              <a:defRPr sz="3800" kern="1200" cap="all" spc="200" baseline="0">
+                <a:solidFill>
+                  <a:srgbClr val="262626"/>
+                </a:solidFill>
+                <a:latin typeface="+mj-lt"/>
+                <a:ea typeface="+mj-ea"/>
+                <a:cs typeface="+mj-cs"/>
+              </a:defRPr>
+            </a:lvl1pPr>
+          </a:lstStyle>
+          <a:p>
+            <a:pPr>
+              <a:tabLst>
+                <a:tab pos="361950" algn="l"/>
+                <a:tab pos="5475288" algn="ctr"/>
+                <a:tab pos="10313988" algn="r"/>
+              </a:tabLst>
+            </a:pPr>
+            <a:r>
+              <a:rPr lang="nl-NL" dirty="0"/>
+              <a:t>IN4331: Web Data Management – Development </a:t>
+            </a:r>
+            <a:r>
+              <a:rPr lang="nl-NL" dirty="0" err="1"/>
+              <a:t>Assignment</a:t>
+            </a:r>
+            <a:r>
+              <a:rPr lang="nl-NL" dirty="0"/>
+              <a:t> - Group 25	</a:t>
+            </a:r>
+            <a:fld id="{309AD0EB-97A9-44CC-874A-892D4CDC277E}" type="datetime2">
+              <a:rPr lang="en-GB" smtClean="0"/>
+              <a:t>Monday, 19 June 2017</a:t>
+            </a:fld>
+            <a:endParaRPr lang="en-GB" dirty="0"/>
+          </a:p>
+        </p:txBody>
+      </p:sp>
+      <p:grpSp>
+        <p:nvGrpSpPr>
+          <p:cNvPr id="35" name="Groep 34">
+            <a:extLst>
+              <a:ext uri="{FF2B5EF4-FFF2-40B4-BE49-F238E27FC236}">
+                <a16:creationId xmlns:a16="http://schemas.microsoft.com/office/drawing/2014/main" id="{0E4E04C9-E9D1-46D3-AAA2-64D8C93C8E3D}"/>
+              </a:ext>
+            </a:extLst>
+          </p:cNvPr>
+          <p:cNvGrpSpPr>
+            <a:grpSpLocks noChangeAspect="1"/>
+          </p:cNvGrpSpPr>
+          <p:nvPr/>
+        </p:nvGrpSpPr>
+        <p:grpSpPr>
+          <a:xfrm>
+            <a:off x="1577650" y="2249956"/>
+            <a:ext cx="2796362" cy="551344"/>
+            <a:chOff x="5518298" y="1102225"/>
+            <a:chExt cx="4633951" cy="913651"/>
+          </a:xfrm>
+        </p:grpSpPr>
+        <p:pic>
+          <p:nvPicPr>
+            <p:cNvPr id="36" name="Picture 4" descr="Afbeeldingsresultaat voor postgresql">
+              <a:extLst>
+                <a:ext uri="{FF2B5EF4-FFF2-40B4-BE49-F238E27FC236}">
+                  <a16:creationId xmlns:a16="http://schemas.microsoft.com/office/drawing/2014/main" id="{E7768734-CF16-4F33-8004-8B10FB5FBC72}"/>
+                </a:ext>
+              </a:extLst>
+            </p:cNvPr>
+            <p:cNvPicPr>
+              <a:picLocks noChangeAspect="1" noChangeArrowheads="1"/>
+            </p:cNvPicPr>
+            <p:nvPr/>
+          </p:nvPicPr>
+          <p:blipFill rotWithShape="1">
+            <a:blip r:embed="rId3">
+              <a:extLst>
+                <a:ext uri="{28A0092B-C50C-407E-A947-70E740481C1C}">
+                  <a14:useLocalDpi xmlns:a14="http://schemas.microsoft.com/office/drawing/2010/main" val="0"/>
+                </a:ext>
+              </a:extLst>
+            </a:blip>
+            <a:srcRect l="16301" t="11632" r="19162" b="30736"/>
+            <a:stretch/>
+          </p:blipFill>
+          <p:spPr bwMode="auto">
+            <a:xfrm>
+              <a:off x="5518298" y="1102225"/>
+              <a:ext cx="920817" cy="913651"/>
+            </a:xfrm>
+            <a:prstGeom prst="rect">
+              <a:avLst/>
+            </a:prstGeom>
+            <a:noFill/>
+            <a:extLst>
+              <a:ext uri="{909E8E84-426E-40DD-AFC4-6F175D3DCCD1}">
+                <a14:hiddenFill xmlns:a14="http://schemas.microsoft.com/office/drawing/2010/main">
+                  <a:solidFill>
+                    <a:srgbClr val="FFFFFF"/>
+                  </a:solidFill>
+                </a14:hiddenFill>
+              </a:ext>
+            </a:extLst>
+          </p:spPr>
+        </p:pic>
+        <p:pic>
+          <p:nvPicPr>
+            <p:cNvPr id="37" name="Picture 4" descr="Afbeeldingsresultaat voor postgresql">
+              <a:extLst>
+                <a:ext uri="{FF2B5EF4-FFF2-40B4-BE49-F238E27FC236}">
+                  <a16:creationId xmlns:a16="http://schemas.microsoft.com/office/drawing/2014/main" id="{4D803605-83C5-4380-9296-265AC2FEC84B}"/>
+                </a:ext>
+              </a:extLst>
+            </p:cNvPr>
+            <p:cNvPicPr>
+              <a:picLocks noChangeAspect="1" noChangeArrowheads="1"/>
+            </p:cNvPicPr>
+            <p:nvPr/>
+          </p:nvPicPr>
+          <p:blipFill rotWithShape="1">
+            <a:blip r:embed="rId4">
+              <a:extLst>
+                <a:ext uri="{BEBA8EAE-BF5A-486C-A8C5-ECC9F3942E4B}">
+                  <a14:imgProps xmlns:a14="http://schemas.microsoft.com/office/drawing/2010/main">
+                    <a14:imgLayer r:embed="rId5">
+                      <a14:imgEffect>
+                        <a14:brightnessContrast bright="100000" contrast="100000"/>
+                      </a14:imgEffect>
+                    </a14:imgLayer>
+                  </a14:imgProps>
+                </a:ext>
+                <a:ext uri="{28A0092B-C50C-407E-A947-70E740481C1C}">
+                  <a14:useLocalDpi xmlns:a14="http://schemas.microsoft.com/office/drawing/2010/main" val="0"/>
+                </a:ext>
+              </a:extLst>
+            </a:blip>
+            <a:srcRect t="74733" b="10380"/>
+            <a:stretch/>
+          </p:blipFill>
+          <p:spPr bwMode="auto">
+            <a:xfrm>
+              <a:off x="6215831" y="1233490"/>
+              <a:ext cx="3936418" cy="651123"/>
+            </a:xfrm>
+            <a:prstGeom prst="rect">
+              <a:avLst/>
+            </a:prstGeom>
+            <a:noFill/>
+            <a:extLst>
+              <a:ext uri="{909E8E84-426E-40DD-AFC4-6F175D3DCCD1}">
+                <a14:hiddenFill xmlns:a14="http://schemas.microsoft.com/office/drawing/2010/main">
+                  <a:solidFill>
+                    <a:srgbClr val="FFFFFF"/>
+                  </a:solidFill>
+                </a14:hiddenFill>
+              </a:ext>
+            </a:extLst>
+          </p:spPr>
+        </p:pic>
+      </p:grpSp>
+      <p:pic>
+        <p:nvPicPr>
+          <p:cNvPr id="38" name="Afbeelding 37">
+            <a:extLst>
+              <a:ext uri="{FF2B5EF4-FFF2-40B4-BE49-F238E27FC236}">
+                <a16:creationId xmlns:a16="http://schemas.microsoft.com/office/drawing/2014/main" id="{C58647B4-9750-4906-972C-BE320E35B9E2}"/>
+              </a:ext>
+            </a:extLst>
+          </p:cNvPr>
+          <p:cNvPicPr>
+            <a:picLocks noChangeAspect="1"/>
+          </p:cNvPicPr>
+          <p:nvPr/>
+        </p:nvPicPr>
+        <p:blipFill>
+          <a:blip r:embed="rId6">
+            <a:extLst>
+              <a:ext uri="{96DAC541-7B7A-43D3-8B79-37D633B846F1}">
+                <asvg:svgBlip xmlns:asvg="http://schemas.microsoft.com/office/drawing/2016/SVG/main" r:embed="rId7"/>
+              </a:ext>
+            </a:extLst>
+          </a:blip>
+          <a:stretch>
+            <a:fillRect/>
+          </a:stretch>
+        </p:blipFill>
+        <p:spPr>
+          <a:xfrm>
+            <a:off x="5173682" y="2134185"/>
+            <a:ext cx="2122607" cy="605367"/>
+          </a:xfrm>
+          <a:prstGeom prst="rect">
+            <a:avLst/>
+          </a:prstGeom>
+        </p:spPr>
+      </p:pic>
+      <p:pic>
+        <p:nvPicPr>
+          <p:cNvPr id="39" name="Picture 8" descr="https://s3.amazonaws.com/dev.assets.neo4j.com/wp-content/uploads/20140926224303/neo4j_logo-facebook.png">
+            <a:extLst>
+              <a:ext uri="{FF2B5EF4-FFF2-40B4-BE49-F238E27FC236}">
+                <a16:creationId xmlns:a16="http://schemas.microsoft.com/office/drawing/2014/main" id="{76FDC220-2B3F-4746-A4D2-9CFDACDFA4C7}"/>
+              </a:ext>
+            </a:extLst>
+          </p:cNvPr>
+          <p:cNvPicPr>
+            <a:picLocks noChangeAspect="1" noChangeArrowheads="1"/>
+          </p:cNvPicPr>
+          <p:nvPr/>
+        </p:nvPicPr>
+        <p:blipFill>
+          <a:blip r:embed="rId8">
+            <a:extLst>
+              <a:ext uri="{28A0092B-C50C-407E-A947-70E740481C1C}">
+                <a14:useLocalDpi xmlns:a14="http://schemas.microsoft.com/office/drawing/2010/main" val="0"/>
+              </a:ext>
+            </a:extLst>
+          </a:blip>
+          <a:srcRect/>
+          <a:stretch>
+            <a:fillRect/>
+          </a:stretch>
+        </p:blipFill>
+        <p:spPr bwMode="auto">
+          <a:xfrm>
+            <a:off x="8586976" y="2072582"/>
+            <a:ext cx="1737710" cy="906092"/>
+          </a:xfrm>
+          <a:prstGeom prst="rect">
+            <a:avLst/>
+          </a:prstGeom>
+          <a:noFill/>
+          <a:extLst>
+            <a:ext uri="{909E8E84-426E-40DD-AFC4-6F175D3DCCD1}">
+              <a14:hiddenFill xmlns:a14="http://schemas.microsoft.com/office/drawing/2010/main">
+                <a:solidFill>
+                  <a:srgbClr val="FFFFFF"/>
+                </a:solidFill>
+              </a14:hiddenFill>
+            </a:ext>
+          </a:extLst>
+        </p:spPr>
+      </p:pic>
+      <p:cxnSp>
+        <p:nvCxnSpPr>
+          <p:cNvPr id="20" name="Rechte verbindingslijn 19">
+            <a:extLst>
+              <a:ext uri="{FF2B5EF4-FFF2-40B4-BE49-F238E27FC236}">
+                <a16:creationId xmlns:a16="http://schemas.microsoft.com/office/drawing/2014/main" id="{2F4016BA-4AAD-4577-9591-4F8B8441C1CC}"/>
+              </a:ext>
+            </a:extLst>
+          </p:cNvPr>
+          <p:cNvCxnSpPr/>
+          <p:nvPr/>
+        </p:nvCxnSpPr>
+        <p:spPr>
+          <a:xfrm>
+            <a:off x="1355831" y="2978674"/>
+            <a:ext cx="9720000" cy="0"/>
+          </a:xfrm>
+          <a:prstGeom prst="line">
+            <a:avLst/>
+          </a:prstGeom>
+          <a:ln w="38100">
+            <a:solidFill>
+              <a:srgbClr val="404040"/>
+            </a:solidFill>
+          </a:ln>
+        </p:spPr>
+        <p:style>
+          <a:lnRef idx="1">
+            <a:schemeClr val="accent1"/>
+          </a:lnRef>
+          <a:fillRef idx="0">
+            <a:schemeClr val="accent1"/>
+          </a:fillRef>
+          <a:effectRef idx="0">
+            <a:schemeClr val="accent1"/>
+          </a:effectRef>
+          <a:fontRef idx="minor">
+            <a:schemeClr val="tx1"/>
+          </a:fontRef>
+        </p:style>
+      </p:cxnSp>
+      <p:sp>
+        <p:nvSpPr>
+          <p:cNvPr id="2" name="Tekstvak 1">
+            <a:extLst>
+              <a:ext uri="{FF2B5EF4-FFF2-40B4-BE49-F238E27FC236}">
+                <a16:creationId xmlns:a16="http://schemas.microsoft.com/office/drawing/2014/main" id="{5454DB04-6555-4F05-9501-0CB48C048C4B}"/>
+              </a:ext>
+            </a:extLst>
+          </p:cNvPr>
+          <p:cNvSpPr txBox="1"/>
+          <p:nvPr/>
+        </p:nvSpPr>
+        <p:spPr>
+          <a:xfrm>
+            <a:off x="4657385" y="3299328"/>
+            <a:ext cx="3198964" cy="2308324"/>
+          </a:xfrm>
+          <a:prstGeom prst="rect">
+            <a:avLst/>
+          </a:prstGeom>
+          <a:noFill/>
+        </p:spPr>
+        <p:txBody>
+          <a:bodyPr wrap="square" rtlCol="0" anchor="ctr">
+            <a:spAutoFit/>
+          </a:bodyPr>
+          <a:lstStyle/>
+          <a:p>
+            <a:r>
+              <a:rPr lang="en-GB" sz="1600" dirty="0">
+                <a:solidFill>
+                  <a:schemeClr val="bg1"/>
+                </a:solidFill>
+              </a:rPr>
+              <a:t>The immediate and fundamental difference between MongoDB and an RDBMS is the underlying data model. A relational database structures data into tables and rows, while MongoDB structures data into collections of JSON documents. JSON is a self-describing, human readable data format.</a:t>
+            </a:r>
+          </a:p>
+        </p:txBody>
+      </p:sp>
+    </p:spTree>
+    <p:extLst>
+      <p:ext uri="{BB962C8B-B14F-4D97-AF65-F5344CB8AC3E}">
+        <p14:creationId xmlns:p14="http://schemas.microsoft.com/office/powerpoint/2010/main" val="338388236"/>
+      </p:ext>
+    </p:extLst>
+  </p:cSld>
+  <p:clrMapOvr>
+    <a:masterClrMapping/>
+  </p:clrMapOvr>
+</p:sld>
+</file>
+
+<file path=ppt/slides/slide9.xml><?xml version="1.0" encoding="utf-8"?>
 <p:sld xmlns:a="http://schemas.openxmlformats.org/drawingml/2006/main" xmlns:r="http://schemas.openxmlformats.org/officeDocument/2006/relationships" xmlns:p="http://schemas.openxmlformats.org/presentationml/2006/main">
   <p:cSld>
     <p:spTree>
@@ -10485,7 +12310,7 @@
         </p:nvCxnSpPr>
         <p:spPr>
           <a:xfrm>
-            <a:off x="1355831" y="4874814"/>
+            <a:off x="1355831" y="4676034"/>
             <a:ext cx="9720000" cy="0"/>
           </a:xfrm>
           <a:prstGeom prst="line">
@@ -10736,6 +12561,162 @@
           </a:p>
         </p:txBody>
       </p:sp>
+      <p:sp>
+        <p:nvSpPr>
+          <p:cNvPr id="2" name="Tekstvak 1">
+            <a:extLst>
+              <a:ext uri="{FF2B5EF4-FFF2-40B4-BE49-F238E27FC236}">
+                <a16:creationId xmlns:a16="http://schemas.microsoft.com/office/drawing/2014/main" id="{5454DB04-6555-4F05-9501-0CB48C048C4B}"/>
+              </a:ext>
+            </a:extLst>
+          </p:cNvPr>
+          <p:cNvSpPr txBox="1"/>
+          <p:nvPr/>
+        </p:nvSpPr>
+        <p:spPr>
+          <a:xfrm>
+            <a:off x="4616349" y="3031624"/>
+            <a:ext cx="3198964" cy="1477328"/>
+          </a:xfrm>
+          <a:prstGeom prst="rect">
+            <a:avLst/>
+          </a:prstGeom>
+          <a:noFill/>
+        </p:spPr>
+        <p:txBody>
+          <a:bodyPr wrap="square" rtlCol="0" anchor="ctr">
+            <a:spAutoFit/>
+          </a:bodyPr>
+          <a:lstStyle/>
+          <a:p>
+            <a:pPr>
+              <a:lnSpc>
+                <a:spcPct val="150000"/>
+              </a:lnSpc>
+            </a:pPr>
+            <a:r>
+              <a:rPr lang="en-GB" sz="2000" dirty="0">
+                <a:solidFill>
+                  <a:schemeClr val="bg1"/>
+                </a:solidFill>
+              </a:rPr>
+              <a:t>Schema-less</a:t>
+            </a:r>
+          </a:p>
+          <a:p>
+            <a:pPr>
+              <a:lnSpc>
+                <a:spcPct val="150000"/>
+              </a:lnSpc>
+            </a:pPr>
+            <a:r>
+              <a:rPr lang="en-GB" sz="2000" dirty="0">
+                <a:solidFill>
+                  <a:schemeClr val="bg1"/>
+                </a:solidFill>
+              </a:rPr>
+              <a:t>Easy scale-out</a:t>
+            </a:r>
+          </a:p>
+          <a:p>
+            <a:pPr>
+              <a:lnSpc>
+                <a:spcPct val="150000"/>
+              </a:lnSpc>
+            </a:pPr>
+            <a:r>
+              <a:rPr lang="en-GB" sz="2000" dirty="0">
+                <a:solidFill>
+                  <a:schemeClr val="bg1"/>
+                </a:solidFill>
+              </a:rPr>
+              <a:t>Cost</a:t>
+            </a:r>
+          </a:p>
+        </p:txBody>
+      </p:sp>
+      <p:sp>
+        <p:nvSpPr>
+          <p:cNvPr id="19" name="Tekstvak 18">
+            <a:extLst>
+              <a:ext uri="{FF2B5EF4-FFF2-40B4-BE49-F238E27FC236}">
+                <a16:creationId xmlns:a16="http://schemas.microsoft.com/office/drawing/2014/main" id="{DC1C0FBE-EB5B-4C8A-9D50-FAF50CC71445}"/>
+              </a:ext>
+            </a:extLst>
+          </p:cNvPr>
+          <p:cNvSpPr txBox="1"/>
+          <p:nvPr/>
+        </p:nvSpPr>
+        <p:spPr>
+          <a:xfrm>
+            <a:off x="4616349" y="4801488"/>
+            <a:ext cx="3219482" cy="1477328"/>
+          </a:xfrm>
+          <a:prstGeom prst="rect">
+            <a:avLst/>
+          </a:prstGeom>
+          <a:noFill/>
+        </p:spPr>
+        <p:txBody>
+          <a:bodyPr wrap="square" rtlCol="0">
+            <a:spAutoFit/>
+          </a:bodyPr>
+          <a:lstStyle/>
+          <a:p>
+            <a:pPr>
+              <a:lnSpc>
+                <a:spcPct val="150000"/>
+              </a:lnSpc>
+            </a:pPr>
+            <a:r>
+              <a:rPr lang="en-GB" sz="2000" dirty="0">
+                <a:solidFill>
+                  <a:schemeClr val="bg1"/>
+                </a:solidFill>
+              </a:rPr>
+              <a:t>Database size</a:t>
+            </a:r>
+          </a:p>
+          <a:p>
+            <a:pPr>
+              <a:lnSpc>
+                <a:spcPct val="150000"/>
+              </a:lnSpc>
+            </a:pPr>
+            <a:r>
+              <a:rPr lang="nl-NL" sz="2000" dirty="0">
+                <a:solidFill>
+                  <a:schemeClr val="bg1"/>
+                </a:solidFill>
+              </a:rPr>
+              <a:t>N</a:t>
+            </a:r>
+            <a:r>
+              <a:rPr lang="en-GB" sz="2000" dirty="0">
+                <a:solidFill>
+                  <a:schemeClr val="bg1"/>
+                </a:solidFill>
+              </a:rPr>
+              <a:t>o support for transactions</a:t>
+            </a:r>
+          </a:p>
+          <a:p>
+            <a:pPr>
+              <a:lnSpc>
+                <a:spcPct val="150000"/>
+              </a:lnSpc>
+            </a:pPr>
+            <a:r>
+              <a:rPr lang="en-GB" sz="2000" dirty="0">
+                <a:solidFill>
+                  <a:schemeClr val="bg1"/>
+                </a:solidFill>
+              </a:rPr>
+              <a:t>Functionality</a:t>
+            </a:r>
+          </a:p>
+        </p:txBody>
+      </p:sp>
     </p:spTree>
     <p:extLst>
       <p:ext uri="{BB962C8B-B14F-4D97-AF65-F5344CB8AC3E}">
@@ -10752,7 +12733,7 @@
 <file path=ppt/theme/theme1.xml><?xml version="1.0" encoding="utf-8"?>
 <a:theme xmlns:a="http://schemas.openxmlformats.org/drawingml/2006/main" name="Pakket">
   <a:themeElements>
-    <a:clrScheme name="Aangepast 8">
+    <a:clrScheme name="Web Data Management">
       <a:dk1>
         <a:srgbClr val="000000"/>
       </a:dk1>

</xml_diff>